<commit_message>
[master] added lesson 7. solves #2.
</commit_message>
<xml_diff>
--- a/lab_06-navigation/lab_06-navigation.pptx
+++ b/lab_06-navigation/lab_06-navigation.pptx
@@ -233,7 +233,7 @@
           <a:p>
             <a:fld id="{81C4B3FE-0320-8142-8396-5C3025C019EC}" type="datetimeFigureOut">
               <a:rPr lang="en-IT" smtClean="0"/>
-              <a:t>11/02/22</a:t>
+              <a:t>16/02/22</a:t>
             </a:fld>
             <a:endParaRPr lang="en-IT"/>
           </a:p>
@@ -16393,7 +16393,7 @@
           <a:p>
             <a:r>
               <a:rPr lang="en-GB" dirty="0"/>
-              <a:t>Exercise 05.01 (easy)</a:t>
+              <a:t>Exercise 06.01 (easy)</a:t>
             </a:r>
           </a:p>
           <a:p>
@@ -17225,7 +17225,7 @@
           <a:p>
             <a:r>
               <a:rPr lang="en-GB" dirty="0"/>
-              <a:t>Exercise 05.02 (medium)</a:t>
+              <a:t>Exercise 06.02 (medium)</a:t>
             </a:r>
           </a:p>
           <a:p>
@@ -17590,7 +17590,7 @@
           <a:p>
             <a:r>
               <a:rPr lang="en-GB" dirty="0"/>
-              <a:t>Exercise 05.03 (medium) </a:t>
+              <a:t>Exercise 06.03 (medium) </a:t>
             </a:r>
           </a:p>
           <a:p>
@@ -17621,13 +17621,8 @@
             <a:pPr lvl="1"/>
             <a:r>
               <a:rPr lang="en-US" dirty="0"/>
-              <a:t>(solution available from the Flutter team in </a:t>
-            </a:r>
-            <a:r>
-              <a:rPr lang="en-US"/>
-              <a:t>the cookbook)</a:t>
-            </a:r>
-            <a:endParaRPr lang="en-US" dirty="0"/>
+              <a:t>(solution available from the Flutter team in the cookbook)</a:t>
+            </a:r>
           </a:p>
           <a:p>
             <a:pPr lvl="1"/>

</xml_diff>

<commit_message>
[master] fixed typo in lesson 6
</commit_message>
<xml_diff>
--- a/lab_06-navigation/lab_06-navigation.pptx
+++ b/lab_06-navigation/lab_06-navigation.pptx
@@ -234,7 +234,7 @@
           <a:p>
             <a:fld id="{81C4B3FE-0320-8142-8396-5C3025C019EC}" type="datetimeFigureOut">
               <a:rPr lang="en-IT" smtClean="0"/>
-              <a:t>24/02/22</a:t>
+              <a:t>05/04/22</a:t>
             </a:fld>
             <a:endParaRPr lang="en-IT"/>
           </a:p>
@@ -2632,6 +2632,7 @@
     <p:sldLayoutId id="2147483649" r:id="rId3"/>
     <p:sldLayoutId id="2147483654" r:id="rId4"/>
   </p:sldLayoutIdLst>
+  <p:hf hdr="0" ftr="0" dt="0"/>
   <p:txStyles>
     <p:titleStyle>
       <a:lvl1pPr algn="ctr" defTabSz="914400" rtl="0" eaLnBrk="1" latinLnBrk="0" hangingPunct="1">
@@ -3765,6 +3766,35 @@
           </a:p>
         </p:txBody>
       </p:sp>
+      <p:sp>
+        <p:nvSpPr>
+          <p:cNvPr id="3" name="Slide Number Placeholder 2">
+            <a:extLst>
+              <a:ext uri="{FF2B5EF4-FFF2-40B4-BE49-F238E27FC236}">
+                <a16:creationId xmlns:a16="http://schemas.microsoft.com/office/drawing/2014/main" id="{E0B2C557-26F1-654F-B142-2DD059D7B5A9}"/>
+              </a:ext>
+            </a:extLst>
+          </p:cNvPr>
+          <p:cNvSpPr>
+            <a:spLocks noGrp="1"/>
+          </p:cNvSpPr>
+          <p:nvPr>
+            <p:ph type="sldNum" sz="quarter" idx="12"/>
+          </p:nvPr>
+        </p:nvSpPr>
+        <p:spPr/>
+        <p:txBody>
+          <a:bodyPr/>
+          <a:lstStyle/>
+          <a:p>
+            <a:fld id="{31DE2C5B-556E-47B8-A792-024C2FCA4ACC}" type="slidenum">
+              <a:rPr lang="en-GB" smtClean="0"/>
+              <a:t>10</a:t>
+            </a:fld>
+            <a:endParaRPr lang="en-GB"/>
+          </a:p>
+        </p:txBody>
+      </p:sp>
     </p:spTree>
     <p:extLst>
       <p:ext uri="{BB962C8B-B14F-4D97-AF65-F5344CB8AC3E}">
@@ -4538,6 +4568,35 @@
           </a:p>
         </p:txBody>
       </p:sp>
+      <p:sp>
+        <p:nvSpPr>
+          <p:cNvPr id="3" name="Slide Number Placeholder 2">
+            <a:extLst>
+              <a:ext uri="{FF2B5EF4-FFF2-40B4-BE49-F238E27FC236}">
+                <a16:creationId xmlns:a16="http://schemas.microsoft.com/office/drawing/2014/main" id="{C164796E-1C23-914E-8970-BF747B14764F}"/>
+              </a:ext>
+            </a:extLst>
+          </p:cNvPr>
+          <p:cNvSpPr>
+            <a:spLocks noGrp="1"/>
+          </p:cNvSpPr>
+          <p:nvPr>
+            <p:ph type="sldNum" sz="quarter" idx="12"/>
+          </p:nvPr>
+        </p:nvSpPr>
+        <p:spPr/>
+        <p:txBody>
+          <a:bodyPr/>
+          <a:lstStyle/>
+          <a:p>
+            <a:fld id="{31DE2C5B-556E-47B8-A792-024C2FCA4ACC}" type="slidenum">
+              <a:rPr lang="en-GB" smtClean="0"/>
+              <a:t>11</a:t>
+            </a:fld>
+            <a:endParaRPr lang="en-GB"/>
+          </a:p>
+        </p:txBody>
+      </p:sp>
     </p:spTree>
     <p:extLst>
       <p:ext uri="{BB962C8B-B14F-4D97-AF65-F5344CB8AC3E}">
@@ -4984,6 +5043,35 @@
           </a:p>
         </p:txBody>
       </p:sp>
+      <p:sp>
+        <p:nvSpPr>
+          <p:cNvPr id="3" name="Slide Number Placeholder 2">
+            <a:extLst>
+              <a:ext uri="{FF2B5EF4-FFF2-40B4-BE49-F238E27FC236}">
+                <a16:creationId xmlns:a16="http://schemas.microsoft.com/office/drawing/2014/main" id="{E5AE08FD-DFA2-404D-B75D-D2BD33598355}"/>
+              </a:ext>
+            </a:extLst>
+          </p:cNvPr>
+          <p:cNvSpPr>
+            <a:spLocks noGrp="1"/>
+          </p:cNvSpPr>
+          <p:nvPr>
+            <p:ph type="sldNum" sz="quarter" idx="12"/>
+          </p:nvPr>
+        </p:nvSpPr>
+        <p:spPr/>
+        <p:txBody>
+          <a:bodyPr/>
+          <a:lstStyle/>
+          <a:p>
+            <a:fld id="{31DE2C5B-556E-47B8-A792-024C2FCA4ACC}" type="slidenum">
+              <a:rPr lang="en-GB" smtClean="0"/>
+              <a:t>12</a:t>
+            </a:fld>
+            <a:endParaRPr lang="en-GB"/>
+          </a:p>
+        </p:txBody>
+      </p:sp>
     </p:spTree>
     <p:extLst>
       <p:ext uri="{BB962C8B-B14F-4D97-AF65-F5344CB8AC3E}">
@@ -6040,18 +6128,6 @@
               <a:rPr lang="en-GB" sz="1600" b="1" dirty="0" err="1">
                 <a:latin typeface="Courier" pitchFamily="2" charset="0"/>
               </a:rPr>
-              <a:t>const</a:t>
-            </a:r>
-            <a:r>
-              <a:rPr lang="en-GB" sz="1600" b="1" dirty="0">
-                <a:latin typeface="Courier" pitchFamily="2" charset="0"/>
-              </a:rPr>
-              <a:t> </a:t>
-            </a:r>
-            <a:r>
-              <a:rPr lang="en-GB" sz="1600" b="1" dirty="0" err="1">
-                <a:latin typeface="Courier" pitchFamily="2" charset="0"/>
-              </a:rPr>
               <a:t>ProfilePage</a:t>
             </a:r>
             <a:r>
@@ -6594,6 +6670,35 @@
               <a:t>Navigator.push()</a:t>
             </a:r>
             <a:endParaRPr lang="en-IT" sz="1100" dirty="0"/>
+          </a:p>
+        </p:txBody>
+      </p:sp>
+      <p:sp>
+        <p:nvSpPr>
+          <p:cNvPr id="3" name="Slide Number Placeholder 2">
+            <a:extLst>
+              <a:ext uri="{FF2B5EF4-FFF2-40B4-BE49-F238E27FC236}">
+                <a16:creationId xmlns:a16="http://schemas.microsoft.com/office/drawing/2014/main" id="{CBDFD127-88C2-C642-9D87-5BF9F2019D02}"/>
+              </a:ext>
+            </a:extLst>
+          </p:cNvPr>
+          <p:cNvSpPr>
+            <a:spLocks noGrp="1"/>
+          </p:cNvSpPr>
+          <p:nvPr>
+            <p:ph type="sldNum" sz="quarter" idx="12"/>
+          </p:nvPr>
+        </p:nvSpPr>
+        <p:spPr/>
+        <p:txBody>
+          <a:bodyPr/>
+          <a:lstStyle/>
+          <a:p>
+            <a:fld id="{31DE2C5B-556E-47B8-A792-024C2FCA4ACC}" type="slidenum">
+              <a:rPr lang="en-GB" smtClean="0"/>
+              <a:t>13</a:t>
+            </a:fld>
+            <a:endParaRPr lang="en-GB"/>
           </a:p>
         </p:txBody>
       </p:sp>
@@ -7361,6 +7466,35 @@
           </a:p>
         </p:txBody>
       </p:sp>
+      <p:sp>
+        <p:nvSpPr>
+          <p:cNvPr id="3" name="Slide Number Placeholder 2">
+            <a:extLst>
+              <a:ext uri="{FF2B5EF4-FFF2-40B4-BE49-F238E27FC236}">
+                <a16:creationId xmlns:a16="http://schemas.microsoft.com/office/drawing/2014/main" id="{879E1271-A494-ED44-AB27-D181BD3A1608}"/>
+              </a:ext>
+            </a:extLst>
+          </p:cNvPr>
+          <p:cNvSpPr>
+            <a:spLocks noGrp="1"/>
+          </p:cNvSpPr>
+          <p:nvPr>
+            <p:ph type="sldNum" sz="quarter" idx="12"/>
+          </p:nvPr>
+        </p:nvSpPr>
+        <p:spPr/>
+        <p:txBody>
+          <a:bodyPr/>
+          <a:lstStyle/>
+          <a:p>
+            <a:fld id="{31DE2C5B-556E-47B8-A792-024C2FCA4ACC}" type="slidenum">
+              <a:rPr lang="en-GB" smtClean="0"/>
+              <a:t>14</a:t>
+            </a:fld>
+            <a:endParaRPr lang="en-GB"/>
+          </a:p>
+        </p:txBody>
+      </p:sp>
     </p:spTree>
     <p:extLst>
       <p:ext uri="{BB962C8B-B14F-4D97-AF65-F5344CB8AC3E}">
@@ -7562,6 +7696,35 @@
           </a:p>
         </p:txBody>
       </p:sp>
+      <p:sp>
+        <p:nvSpPr>
+          <p:cNvPr id="4" name="Slide Number Placeholder 3">
+            <a:extLst>
+              <a:ext uri="{FF2B5EF4-FFF2-40B4-BE49-F238E27FC236}">
+                <a16:creationId xmlns:a16="http://schemas.microsoft.com/office/drawing/2014/main" id="{7EE42D93-64B8-AA4E-9B71-607EA3D58073}"/>
+              </a:ext>
+            </a:extLst>
+          </p:cNvPr>
+          <p:cNvSpPr>
+            <a:spLocks noGrp="1"/>
+          </p:cNvSpPr>
+          <p:nvPr>
+            <p:ph type="sldNum" sz="quarter" idx="12"/>
+          </p:nvPr>
+        </p:nvSpPr>
+        <p:spPr/>
+        <p:txBody>
+          <a:bodyPr/>
+          <a:lstStyle/>
+          <a:p>
+            <a:fld id="{31DE2C5B-556E-47B8-A792-024C2FCA4ACC}" type="slidenum">
+              <a:rPr lang="en-GB" smtClean="0"/>
+              <a:t>15</a:t>
+            </a:fld>
+            <a:endParaRPr lang="en-GB"/>
+          </a:p>
+        </p:txBody>
+      </p:sp>
     </p:spTree>
     <p:extLst>
       <p:ext uri="{BB962C8B-B14F-4D97-AF65-F5344CB8AC3E}">
@@ -7737,6 +7900,35 @@
           </a:p>
         </p:txBody>
       </p:sp>
+      <p:sp>
+        <p:nvSpPr>
+          <p:cNvPr id="4" name="Slide Number Placeholder 3">
+            <a:extLst>
+              <a:ext uri="{FF2B5EF4-FFF2-40B4-BE49-F238E27FC236}">
+                <a16:creationId xmlns:a16="http://schemas.microsoft.com/office/drawing/2014/main" id="{322FC86B-EC6C-4344-AA70-A15054DA4CC4}"/>
+              </a:ext>
+            </a:extLst>
+          </p:cNvPr>
+          <p:cNvSpPr>
+            <a:spLocks noGrp="1"/>
+          </p:cNvSpPr>
+          <p:nvPr>
+            <p:ph type="sldNum" sz="quarter" idx="12"/>
+          </p:nvPr>
+        </p:nvSpPr>
+        <p:spPr/>
+        <p:txBody>
+          <a:bodyPr/>
+          <a:lstStyle/>
+          <a:p>
+            <a:fld id="{31DE2C5B-556E-47B8-A792-024C2FCA4ACC}" type="slidenum">
+              <a:rPr lang="en-GB" smtClean="0"/>
+              <a:t>16</a:t>
+            </a:fld>
+            <a:endParaRPr lang="en-GB"/>
+          </a:p>
+        </p:txBody>
+      </p:sp>
     </p:spTree>
     <p:extLst>
       <p:ext uri="{BB962C8B-B14F-4D97-AF65-F5344CB8AC3E}">
@@ -8161,6 +8353,35 @@
           </a:fontRef>
         </p:style>
       </p:cxnSp>
+      <p:sp>
+        <p:nvSpPr>
+          <p:cNvPr id="7" name="Slide Number Placeholder 6">
+            <a:extLst>
+              <a:ext uri="{FF2B5EF4-FFF2-40B4-BE49-F238E27FC236}">
+                <a16:creationId xmlns:a16="http://schemas.microsoft.com/office/drawing/2014/main" id="{E0CBED1D-48FE-0A4C-9B90-AAF72EB51143}"/>
+              </a:ext>
+            </a:extLst>
+          </p:cNvPr>
+          <p:cNvSpPr>
+            <a:spLocks noGrp="1"/>
+          </p:cNvSpPr>
+          <p:nvPr>
+            <p:ph type="sldNum" sz="quarter" idx="12"/>
+          </p:nvPr>
+        </p:nvSpPr>
+        <p:spPr/>
+        <p:txBody>
+          <a:bodyPr/>
+          <a:lstStyle/>
+          <a:p>
+            <a:fld id="{31DE2C5B-556E-47B8-A792-024C2FCA4ACC}" type="slidenum">
+              <a:rPr lang="en-GB" smtClean="0"/>
+              <a:t>17</a:t>
+            </a:fld>
+            <a:endParaRPr lang="en-GB"/>
+          </a:p>
+        </p:txBody>
+      </p:sp>
     </p:spTree>
     <p:extLst>
       <p:ext uri="{BB962C8B-B14F-4D97-AF65-F5344CB8AC3E}">
@@ -9749,6 +9970,35 @@
           </a:p>
         </p:txBody>
       </p:sp>
+      <p:sp>
+        <p:nvSpPr>
+          <p:cNvPr id="3" name="Slide Number Placeholder 2">
+            <a:extLst>
+              <a:ext uri="{FF2B5EF4-FFF2-40B4-BE49-F238E27FC236}">
+                <a16:creationId xmlns:a16="http://schemas.microsoft.com/office/drawing/2014/main" id="{B7D1818D-4C05-5242-900B-869A1A18CC53}"/>
+              </a:ext>
+            </a:extLst>
+          </p:cNvPr>
+          <p:cNvSpPr>
+            <a:spLocks noGrp="1"/>
+          </p:cNvSpPr>
+          <p:nvPr>
+            <p:ph type="sldNum" sz="quarter" idx="12"/>
+          </p:nvPr>
+        </p:nvSpPr>
+        <p:spPr/>
+        <p:txBody>
+          <a:bodyPr/>
+          <a:lstStyle/>
+          <a:p>
+            <a:fld id="{31DE2C5B-556E-47B8-A792-024C2FCA4ACC}" type="slidenum">
+              <a:rPr lang="en-GB" smtClean="0"/>
+              <a:t>18</a:t>
+            </a:fld>
+            <a:endParaRPr lang="en-GB"/>
+          </a:p>
+        </p:txBody>
+      </p:sp>
     </p:spTree>
     <p:extLst>
       <p:ext uri="{BB962C8B-B14F-4D97-AF65-F5344CB8AC3E}">
@@ -9950,6 +10200,35 @@
           </a:p>
         </p:txBody>
       </p:sp>
+      <p:sp>
+        <p:nvSpPr>
+          <p:cNvPr id="4" name="Slide Number Placeholder 3">
+            <a:extLst>
+              <a:ext uri="{FF2B5EF4-FFF2-40B4-BE49-F238E27FC236}">
+                <a16:creationId xmlns:a16="http://schemas.microsoft.com/office/drawing/2014/main" id="{84BFC48C-46D7-164D-B8A5-DF6FF27A4441}"/>
+              </a:ext>
+            </a:extLst>
+          </p:cNvPr>
+          <p:cNvSpPr>
+            <a:spLocks noGrp="1"/>
+          </p:cNvSpPr>
+          <p:nvPr>
+            <p:ph type="sldNum" sz="quarter" idx="12"/>
+          </p:nvPr>
+        </p:nvSpPr>
+        <p:spPr/>
+        <p:txBody>
+          <a:bodyPr/>
+          <a:lstStyle/>
+          <a:p>
+            <a:fld id="{31DE2C5B-556E-47B8-A792-024C2FCA4ACC}" type="slidenum">
+              <a:rPr lang="en-GB" smtClean="0"/>
+              <a:t>19</a:t>
+            </a:fld>
+            <a:endParaRPr lang="en-GB"/>
+          </a:p>
+        </p:txBody>
+      </p:sp>
     </p:spTree>
     <p:extLst>
       <p:ext uri="{BB962C8B-B14F-4D97-AF65-F5344CB8AC3E}">
@@ -10148,6 +10427,35 @@
           </a:p>
           <a:p>
             <a:endParaRPr lang="en-GB" dirty="0"/>
+          </a:p>
+        </p:txBody>
+      </p:sp>
+      <p:sp>
+        <p:nvSpPr>
+          <p:cNvPr id="4" name="Slide Number Placeholder 3">
+            <a:extLst>
+              <a:ext uri="{FF2B5EF4-FFF2-40B4-BE49-F238E27FC236}">
+                <a16:creationId xmlns:a16="http://schemas.microsoft.com/office/drawing/2014/main" id="{B0275233-B923-8E48-A452-294188744343}"/>
+              </a:ext>
+            </a:extLst>
+          </p:cNvPr>
+          <p:cNvSpPr>
+            <a:spLocks noGrp="1"/>
+          </p:cNvSpPr>
+          <p:nvPr>
+            <p:ph type="sldNum" sz="quarter" idx="12"/>
+          </p:nvPr>
+        </p:nvSpPr>
+        <p:spPr/>
+        <p:txBody>
+          <a:bodyPr/>
+          <a:lstStyle/>
+          <a:p>
+            <a:fld id="{31DE2C5B-556E-47B8-A792-024C2FCA4ACC}" type="slidenum">
+              <a:rPr lang="en-GB" smtClean="0"/>
+              <a:t>2</a:t>
+            </a:fld>
+            <a:endParaRPr lang="en-GB"/>
           </a:p>
         </p:txBody>
       </p:sp>
@@ -10468,6 +10776,35 @@
           </a:fontRef>
         </p:style>
       </p:cxnSp>
+      <p:sp>
+        <p:nvSpPr>
+          <p:cNvPr id="3" name="Slide Number Placeholder 2">
+            <a:extLst>
+              <a:ext uri="{FF2B5EF4-FFF2-40B4-BE49-F238E27FC236}">
+                <a16:creationId xmlns:a16="http://schemas.microsoft.com/office/drawing/2014/main" id="{89F0D3FF-3086-0A41-BE91-8A14CECCE9E0}"/>
+              </a:ext>
+            </a:extLst>
+          </p:cNvPr>
+          <p:cNvSpPr>
+            <a:spLocks noGrp="1"/>
+          </p:cNvSpPr>
+          <p:nvPr>
+            <p:ph type="sldNum" sz="quarter" idx="12"/>
+          </p:nvPr>
+        </p:nvSpPr>
+        <p:spPr/>
+        <p:txBody>
+          <a:bodyPr/>
+          <a:lstStyle/>
+          <a:p>
+            <a:fld id="{31DE2C5B-556E-47B8-A792-024C2FCA4ACC}" type="slidenum">
+              <a:rPr lang="en-GB" smtClean="0"/>
+              <a:t>20</a:t>
+            </a:fld>
+            <a:endParaRPr lang="en-GB"/>
+          </a:p>
+        </p:txBody>
+      </p:sp>
     </p:spTree>
     <p:extLst>
       <p:ext uri="{BB962C8B-B14F-4D97-AF65-F5344CB8AC3E}">
@@ -11369,6 +11706,35 @@
           </a:p>
         </p:txBody>
       </p:sp>
+      <p:sp>
+        <p:nvSpPr>
+          <p:cNvPr id="3" name="Slide Number Placeholder 2">
+            <a:extLst>
+              <a:ext uri="{FF2B5EF4-FFF2-40B4-BE49-F238E27FC236}">
+                <a16:creationId xmlns:a16="http://schemas.microsoft.com/office/drawing/2014/main" id="{5E9FB28B-B6BD-794F-BB0D-C712EDE4D5EF}"/>
+              </a:ext>
+            </a:extLst>
+          </p:cNvPr>
+          <p:cNvSpPr>
+            <a:spLocks noGrp="1"/>
+          </p:cNvSpPr>
+          <p:nvPr>
+            <p:ph type="sldNum" sz="quarter" idx="12"/>
+          </p:nvPr>
+        </p:nvSpPr>
+        <p:spPr/>
+        <p:txBody>
+          <a:bodyPr/>
+          <a:lstStyle/>
+          <a:p>
+            <a:fld id="{31DE2C5B-556E-47B8-A792-024C2FCA4ACC}" type="slidenum">
+              <a:rPr lang="en-GB" smtClean="0"/>
+              <a:t>21</a:t>
+            </a:fld>
+            <a:endParaRPr lang="en-GB"/>
+          </a:p>
+        </p:txBody>
+      </p:sp>
     </p:spTree>
     <p:extLst>
       <p:ext uri="{BB962C8B-B14F-4D97-AF65-F5344CB8AC3E}">
@@ -11635,6 +12001,35 @@
           </a:p>
         </p:txBody>
       </p:sp>
+      <p:sp>
+        <p:nvSpPr>
+          <p:cNvPr id="4" name="Slide Number Placeholder 3">
+            <a:extLst>
+              <a:ext uri="{FF2B5EF4-FFF2-40B4-BE49-F238E27FC236}">
+                <a16:creationId xmlns:a16="http://schemas.microsoft.com/office/drawing/2014/main" id="{D32756C3-B67B-6144-81A9-ACE6CC97099D}"/>
+              </a:ext>
+            </a:extLst>
+          </p:cNvPr>
+          <p:cNvSpPr>
+            <a:spLocks noGrp="1"/>
+          </p:cNvSpPr>
+          <p:nvPr>
+            <p:ph type="sldNum" sz="quarter" idx="12"/>
+          </p:nvPr>
+        </p:nvSpPr>
+        <p:spPr/>
+        <p:txBody>
+          <a:bodyPr/>
+          <a:lstStyle/>
+          <a:p>
+            <a:fld id="{31DE2C5B-556E-47B8-A792-024C2FCA4ACC}" type="slidenum">
+              <a:rPr lang="en-GB" smtClean="0"/>
+              <a:t>22</a:t>
+            </a:fld>
+            <a:endParaRPr lang="en-GB"/>
+          </a:p>
+        </p:txBody>
+      </p:sp>
     </p:spTree>
     <p:extLst>
       <p:ext uri="{BB962C8B-B14F-4D97-AF65-F5344CB8AC3E}">
@@ -12495,6 +12890,35 @@
           </a:p>
         </p:txBody>
       </p:sp>
+      <p:sp>
+        <p:nvSpPr>
+          <p:cNvPr id="3" name="Slide Number Placeholder 2">
+            <a:extLst>
+              <a:ext uri="{FF2B5EF4-FFF2-40B4-BE49-F238E27FC236}">
+                <a16:creationId xmlns:a16="http://schemas.microsoft.com/office/drawing/2014/main" id="{6E73C37A-26D0-E144-8144-A6E0A8E131A4}"/>
+              </a:ext>
+            </a:extLst>
+          </p:cNvPr>
+          <p:cNvSpPr>
+            <a:spLocks noGrp="1"/>
+          </p:cNvSpPr>
+          <p:nvPr>
+            <p:ph type="sldNum" sz="quarter" idx="12"/>
+          </p:nvPr>
+        </p:nvSpPr>
+        <p:spPr/>
+        <p:txBody>
+          <a:bodyPr/>
+          <a:lstStyle/>
+          <a:p>
+            <a:fld id="{31DE2C5B-556E-47B8-A792-024C2FCA4ACC}" type="slidenum">
+              <a:rPr lang="en-GB" smtClean="0"/>
+              <a:t>23</a:t>
+            </a:fld>
+            <a:endParaRPr lang="en-GB"/>
+          </a:p>
+        </p:txBody>
+      </p:sp>
     </p:spTree>
     <p:extLst>
       <p:ext uri="{BB962C8B-B14F-4D97-AF65-F5344CB8AC3E}">
@@ -12680,7 +13104,7 @@
               <a:rPr lang="en-IT" dirty="0">
                 <a:latin typeface="Palatino Linotype" panose="02040502050505030304" pitchFamily="18" charset="0"/>
               </a:rPr>
-              <a:t>To figure out what this is, you can imagine that as a utility that stands between the prevoius route (here </a:t>
+              <a:t>To figure out what this is, you can imagine that as a utility that stands between the previous route (here </a:t>
             </a:r>
             <a:r>
               <a:rPr lang="en-IT" dirty="0">
@@ -13702,6 +14126,35 @@
               </a:rPr>
               <a:t>...</a:t>
             </a:r>
+          </a:p>
+        </p:txBody>
+      </p:sp>
+      <p:sp>
+        <p:nvSpPr>
+          <p:cNvPr id="3" name="Slide Number Placeholder 2">
+            <a:extLst>
+              <a:ext uri="{FF2B5EF4-FFF2-40B4-BE49-F238E27FC236}">
+                <a16:creationId xmlns:a16="http://schemas.microsoft.com/office/drawing/2014/main" id="{0EE000C3-1DCC-E346-B598-ED28CA9CAAAC}"/>
+              </a:ext>
+            </a:extLst>
+          </p:cNvPr>
+          <p:cNvSpPr>
+            <a:spLocks noGrp="1"/>
+          </p:cNvSpPr>
+          <p:nvPr>
+            <p:ph type="sldNum" sz="quarter" idx="12"/>
+          </p:nvPr>
+        </p:nvSpPr>
+        <p:spPr/>
+        <p:txBody>
+          <a:bodyPr/>
+          <a:lstStyle/>
+          <a:p>
+            <a:fld id="{31DE2C5B-556E-47B8-A792-024C2FCA4ACC}" type="slidenum">
+              <a:rPr lang="en-GB" smtClean="0"/>
+              <a:t>24</a:t>
+            </a:fld>
+            <a:endParaRPr lang="en-GB"/>
           </a:p>
         </p:txBody>
       </p:sp>
@@ -13903,6 +14356,35 @@
           </a:p>
           <a:p>
             <a:endParaRPr lang="en-GB" dirty="0"/>
+          </a:p>
+        </p:txBody>
+      </p:sp>
+      <p:sp>
+        <p:nvSpPr>
+          <p:cNvPr id="4" name="Slide Number Placeholder 3">
+            <a:extLst>
+              <a:ext uri="{FF2B5EF4-FFF2-40B4-BE49-F238E27FC236}">
+                <a16:creationId xmlns:a16="http://schemas.microsoft.com/office/drawing/2014/main" id="{682FE927-2862-6948-8C70-BE9C6A34FB94}"/>
+              </a:ext>
+            </a:extLst>
+          </p:cNvPr>
+          <p:cNvSpPr>
+            <a:spLocks noGrp="1"/>
+          </p:cNvSpPr>
+          <p:nvPr>
+            <p:ph type="sldNum" sz="quarter" idx="12"/>
+          </p:nvPr>
+        </p:nvSpPr>
+        <p:spPr/>
+        <p:txBody>
+          <a:bodyPr/>
+          <a:lstStyle/>
+          <a:p>
+            <a:fld id="{31DE2C5B-556E-47B8-A792-024C2FCA4ACC}" type="slidenum">
+              <a:rPr lang="en-GB" smtClean="0"/>
+              <a:t>25</a:t>
+            </a:fld>
+            <a:endParaRPr lang="en-GB"/>
           </a:p>
         </p:txBody>
       </p:sp>
@@ -14233,6 +14715,35 @@
           </a:fontRef>
         </p:style>
       </p:cxnSp>
+      <p:sp>
+        <p:nvSpPr>
+          <p:cNvPr id="3" name="Slide Number Placeholder 2">
+            <a:extLst>
+              <a:ext uri="{FF2B5EF4-FFF2-40B4-BE49-F238E27FC236}">
+                <a16:creationId xmlns:a16="http://schemas.microsoft.com/office/drawing/2014/main" id="{91BB0005-6D8A-4A4F-8EDA-C60CE722588B}"/>
+              </a:ext>
+            </a:extLst>
+          </p:cNvPr>
+          <p:cNvSpPr>
+            <a:spLocks noGrp="1"/>
+          </p:cNvSpPr>
+          <p:nvPr>
+            <p:ph type="sldNum" sz="quarter" idx="12"/>
+          </p:nvPr>
+        </p:nvSpPr>
+        <p:spPr/>
+        <p:txBody>
+          <a:bodyPr/>
+          <a:lstStyle/>
+          <a:p>
+            <a:fld id="{31DE2C5B-556E-47B8-A792-024C2FCA4ACC}" type="slidenum">
+              <a:rPr lang="en-GB" smtClean="0"/>
+              <a:t>26</a:t>
+            </a:fld>
+            <a:endParaRPr lang="en-GB"/>
+          </a:p>
+        </p:txBody>
+      </p:sp>
     </p:spTree>
     <p:extLst>
       <p:ext uri="{BB962C8B-B14F-4D97-AF65-F5344CB8AC3E}">
@@ -15005,6 +15516,35 @@
           </a:p>
         </p:txBody>
       </p:sp>
+      <p:sp>
+        <p:nvSpPr>
+          <p:cNvPr id="3" name="Slide Number Placeholder 2">
+            <a:extLst>
+              <a:ext uri="{FF2B5EF4-FFF2-40B4-BE49-F238E27FC236}">
+                <a16:creationId xmlns:a16="http://schemas.microsoft.com/office/drawing/2014/main" id="{6FABA87C-B8B5-3C46-B596-05058C085709}"/>
+              </a:ext>
+            </a:extLst>
+          </p:cNvPr>
+          <p:cNvSpPr>
+            <a:spLocks noGrp="1"/>
+          </p:cNvSpPr>
+          <p:nvPr>
+            <p:ph type="sldNum" sz="quarter" idx="12"/>
+          </p:nvPr>
+        </p:nvSpPr>
+        <p:spPr/>
+        <p:txBody>
+          <a:bodyPr/>
+          <a:lstStyle/>
+          <a:p>
+            <a:fld id="{31DE2C5B-556E-47B8-A792-024C2FCA4ACC}" type="slidenum">
+              <a:rPr lang="en-GB" smtClean="0"/>
+              <a:t>27</a:t>
+            </a:fld>
+            <a:endParaRPr lang="en-GB"/>
+          </a:p>
+        </p:txBody>
+      </p:sp>
     </p:spTree>
     <p:extLst>
       <p:ext uri="{BB962C8B-B14F-4D97-AF65-F5344CB8AC3E}">
@@ -15284,6 +15824,35 @@
           </a:p>
         </p:txBody>
       </p:sp>
+      <p:sp>
+        <p:nvSpPr>
+          <p:cNvPr id="4" name="Slide Number Placeholder 3">
+            <a:extLst>
+              <a:ext uri="{FF2B5EF4-FFF2-40B4-BE49-F238E27FC236}">
+                <a16:creationId xmlns:a16="http://schemas.microsoft.com/office/drawing/2014/main" id="{21B81ACF-E8FA-3344-903F-A06FD30D5359}"/>
+              </a:ext>
+            </a:extLst>
+          </p:cNvPr>
+          <p:cNvSpPr>
+            <a:spLocks noGrp="1"/>
+          </p:cNvSpPr>
+          <p:nvPr>
+            <p:ph type="sldNum" sz="quarter" idx="12"/>
+          </p:nvPr>
+        </p:nvSpPr>
+        <p:spPr/>
+        <p:txBody>
+          <a:bodyPr/>
+          <a:lstStyle/>
+          <a:p>
+            <a:fld id="{31DE2C5B-556E-47B8-A792-024C2FCA4ACC}" type="slidenum">
+              <a:rPr lang="en-GB" smtClean="0"/>
+              <a:t>28</a:t>
+            </a:fld>
+            <a:endParaRPr lang="en-GB"/>
+          </a:p>
+        </p:txBody>
+      </p:sp>
     </p:spTree>
     <p:extLst>
       <p:ext uri="{BB962C8B-B14F-4D97-AF65-F5344CB8AC3E}">
@@ -16004,6 +16573,35 @@
           </a:p>
         </p:txBody>
       </p:sp>
+      <p:sp>
+        <p:nvSpPr>
+          <p:cNvPr id="3" name="Slide Number Placeholder 2">
+            <a:extLst>
+              <a:ext uri="{FF2B5EF4-FFF2-40B4-BE49-F238E27FC236}">
+                <a16:creationId xmlns:a16="http://schemas.microsoft.com/office/drawing/2014/main" id="{A4636188-5303-C44D-84F6-5A6F32855E06}"/>
+              </a:ext>
+            </a:extLst>
+          </p:cNvPr>
+          <p:cNvSpPr>
+            <a:spLocks noGrp="1"/>
+          </p:cNvSpPr>
+          <p:nvPr>
+            <p:ph type="sldNum" sz="quarter" idx="12"/>
+          </p:nvPr>
+        </p:nvSpPr>
+        <p:spPr/>
+        <p:txBody>
+          <a:bodyPr/>
+          <a:lstStyle/>
+          <a:p>
+            <a:fld id="{31DE2C5B-556E-47B8-A792-024C2FCA4ACC}" type="slidenum">
+              <a:rPr lang="en-GB" smtClean="0"/>
+              <a:t>29</a:t>
+            </a:fld>
+            <a:endParaRPr lang="en-GB"/>
+          </a:p>
+        </p:txBody>
+      </p:sp>
     </p:spTree>
     <p:extLst>
       <p:ext uri="{BB962C8B-B14F-4D97-AF65-F5344CB8AC3E}">
@@ -18259,6 +18857,35 @@
           </a:prstGeom>
         </p:spPr>
       </p:pic>
+      <p:sp>
+        <p:nvSpPr>
+          <p:cNvPr id="3" name="Slide Number Placeholder 2">
+            <a:extLst>
+              <a:ext uri="{FF2B5EF4-FFF2-40B4-BE49-F238E27FC236}">
+                <a16:creationId xmlns:a16="http://schemas.microsoft.com/office/drawing/2014/main" id="{0EB565B9-2E97-3545-9BC0-3C5C94BE366C}"/>
+              </a:ext>
+            </a:extLst>
+          </p:cNvPr>
+          <p:cNvSpPr>
+            <a:spLocks noGrp="1"/>
+          </p:cNvSpPr>
+          <p:nvPr>
+            <p:ph type="sldNum" sz="quarter" idx="12"/>
+          </p:nvPr>
+        </p:nvSpPr>
+        <p:spPr/>
+        <p:txBody>
+          <a:bodyPr/>
+          <a:lstStyle/>
+          <a:p>
+            <a:fld id="{31DE2C5B-556E-47B8-A792-024C2FCA4ACC}" type="slidenum">
+              <a:rPr lang="en-GB" smtClean="0"/>
+              <a:t>3</a:t>
+            </a:fld>
+            <a:endParaRPr lang="en-GB"/>
+          </a:p>
+        </p:txBody>
+      </p:sp>
     </p:spTree>
     <p:extLst>
       <p:ext uri="{BB962C8B-B14F-4D97-AF65-F5344CB8AC3E}">
@@ -19124,6 +19751,35 @@
           </a:p>
         </p:txBody>
       </p:sp>
+      <p:sp>
+        <p:nvSpPr>
+          <p:cNvPr id="3" name="Slide Number Placeholder 2">
+            <a:extLst>
+              <a:ext uri="{FF2B5EF4-FFF2-40B4-BE49-F238E27FC236}">
+                <a16:creationId xmlns:a16="http://schemas.microsoft.com/office/drawing/2014/main" id="{3A5E451F-5C66-C44E-BE18-C94ECA552BEA}"/>
+              </a:ext>
+            </a:extLst>
+          </p:cNvPr>
+          <p:cNvSpPr>
+            <a:spLocks noGrp="1"/>
+          </p:cNvSpPr>
+          <p:nvPr>
+            <p:ph type="sldNum" sz="quarter" idx="12"/>
+          </p:nvPr>
+        </p:nvSpPr>
+        <p:spPr/>
+        <p:txBody>
+          <a:bodyPr/>
+          <a:lstStyle/>
+          <a:p>
+            <a:fld id="{31DE2C5B-556E-47B8-A792-024C2FCA4ACC}" type="slidenum">
+              <a:rPr lang="en-GB" smtClean="0"/>
+              <a:t>30</a:t>
+            </a:fld>
+            <a:endParaRPr lang="en-GB"/>
+          </a:p>
+        </p:txBody>
+      </p:sp>
     </p:spTree>
     <p:extLst>
       <p:ext uri="{BB962C8B-B14F-4D97-AF65-F5344CB8AC3E}">
@@ -19325,6 +19981,35 @@
           </a:p>
         </p:txBody>
       </p:sp>
+      <p:sp>
+        <p:nvSpPr>
+          <p:cNvPr id="4" name="Slide Number Placeholder 3">
+            <a:extLst>
+              <a:ext uri="{FF2B5EF4-FFF2-40B4-BE49-F238E27FC236}">
+                <a16:creationId xmlns:a16="http://schemas.microsoft.com/office/drawing/2014/main" id="{7B92D939-F8DA-2243-8E3D-55072F9F7FE4}"/>
+              </a:ext>
+            </a:extLst>
+          </p:cNvPr>
+          <p:cNvSpPr>
+            <a:spLocks noGrp="1"/>
+          </p:cNvSpPr>
+          <p:nvPr>
+            <p:ph type="sldNum" sz="quarter" idx="12"/>
+          </p:nvPr>
+        </p:nvSpPr>
+        <p:spPr/>
+        <p:txBody>
+          <a:bodyPr/>
+          <a:lstStyle/>
+          <a:p>
+            <a:fld id="{31DE2C5B-556E-47B8-A792-024C2FCA4ACC}" type="slidenum">
+              <a:rPr lang="en-GB" smtClean="0"/>
+              <a:t>31</a:t>
+            </a:fld>
+            <a:endParaRPr lang="en-GB"/>
+          </a:p>
+        </p:txBody>
+      </p:sp>
     </p:spTree>
     <p:extLst>
       <p:ext uri="{BB962C8B-B14F-4D97-AF65-F5344CB8AC3E}">
@@ -19442,7 +20127,15 @@
             <a:pPr lvl="1"/>
             <a:r>
               <a:rPr lang="en-US" dirty="0"/>
-              <a:t>Reproduce the app navigation structure on the right using the named routing approach.</a:t>
+              <a:t>Reproduce the app navigation structure on the right using the </a:t>
+            </a:r>
+            <a:r>
+              <a:rPr lang="en-US" b="1" dirty="0"/>
+              <a:t>named routing approach</a:t>
+            </a:r>
+            <a:r>
+              <a:rPr lang="en-US" dirty="0"/>
+              <a:t>.</a:t>
             </a:r>
           </a:p>
         </p:txBody>
@@ -20157,6 +20850,35 @@
           </a:fontRef>
         </p:style>
       </p:cxnSp>
+      <p:sp>
+        <p:nvSpPr>
+          <p:cNvPr id="4" name="Slide Number Placeholder 3">
+            <a:extLst>
+              <a:ext uri="{FF2B5EF4-FFF2-40B4-BE49-F238E27FC236}">
+                <a16:creationId xmlns:a16="http://schemas.microsoft.com/office/drawing/2014/main" id="{34A536EB-A6E3-4947-B493-DEACE36B885E}"/>
+              </a:ext>
+            </a:extLst>
+          </p:cNvPr>
+          <p:cNvSpPr>
+            <a:spLocks noGrp="1"/>
+          </p:cNvSpPr>
+          <p:nvPr>
+            <p:ph type="sldNum" sz="quarter" idx="12"/>
+          </p:nvPr>
+        </p:nvSpPr>
+        <p:spPr/>
+        <p:txBody>
+          <a:bodyPr/>
+          <a:lstStyle/>
+          <a:p>
+            <a:fld id="{31DE2C5B-556E-47B8-A792-024C2FCA4ACC}" type="slidenum">
+              <a:rPr lang="en-GB" smtClean="0"/>
+              <a:t>32</a:t>
+            </a:fld>
+            <a:endParaRPr lang="en-GB"/>
+          </a:p>
+        </p:txBody>
+      </p:sp>
     </p:spTree>
     <p:extLst>
       <p:ext uri="{BB962C8B-B14F-4D97-AF65-F5344CB8AC3E}">
@@ -20522,6 +21244,35 @@
           </a:fontRef>
         </p:style>
       </p:cxnSp>
+      <p:sp>
+        <p:nvSpPr>
+          <p:cNvPr id="4" name="Slide Number Placeholder 3">
+            <a:extLst>
+              <a:ext uri="{FF2B5EF4-FFF2-40B4-BE49-F238E27FC236}">
+                <a16:creationId xmlns:a16="http://schemas.microsoft.com/office/drawing/2014/main" id="{09C53CEF-F50A-E24A-A446-2E46FF5C8895}"/>
+              </a:ext>
+            </a:extLst>
+          </p:cNvPr>
+          <p:cNvSpPr>
+            <a:spLocks noGrp="1"/>
+          </p:cNvSpPr>
+          <p:nvPr>
+            <p:ph type="sldNum" sz="quarter" idx="12"/>
+          </p:nvPr>
+        </p:nvSpPr>
+        <p:spPr/>
+        <p:txBody>
+          <a:bodyPr/>
+          <a:lstStyle/>
+          <a:p>
+            <a:fld id="{31DE2C5B-556E-47B8-A792-024C2FCA4ACC}" type="slidenum">
+              <a:rPr lang="en-GB" smtClean="0"/>
+              <a:t>33</a:t>
+            </a:fld>
+            <a:endParaRPr lang="en-GB"/>
+          </a:p>
+        </p:txBody>
+      </p:sp>
     </p:spTree>
     <p:extLst>
       <p:ext uri="{BB962C8B-B14F-4D97-AF65-F5344CB8AC3E}">
@@ -20804,6 +21555,35 @@
           </a:fontRef>
         </p:style>
       </p:cxnSp>
+      <p:sp>
+        <p:nvSpPr>
+          <p:cNvPr id="4" name="Slide Number Placeholder 3">
+            <a:extLst>
+              <a:ext uri="{FF2B5EF4-FFF2-40B4-BE49-F238E27FC236}">
+                <a16:creationId xmlns:a16="http://schemas.microsoft.com/office/drawing/2014/main" id="{CED2DBDB-79EE-304F-8820-6D678EA9BB74}"/>
+              </a:ext>
+            </a:extLst>
+          </p:cNvPr>
+          <p:cNvSpPr>
+            <a:spLocks noGrp="1"/>
+          </p:cNvSpPr>
+          <p:nvPr>
+            <p:ph type="sldNum" sz="quarter" idx="12"/>
+          </p:nvPr>
+        </p:nvSpPr>
+        <p:spPr/>
+        <p:txBody>
+          <a:bodyPr/>
+          <a:lstStyle/>
+          <a:p>
+            <a:fld id="{31DE2C5B-556E-47B8-A792-024C2FCA4ACC}" type="slidenum">
+              <a:rPr lang="en-GB" smtClean="0"/>
+              <a:t>34</a:t>
+            </a:fld>
+            <a:endParaRPr lang="en-GB"/>
+          </a:p>
+        </p:txBody>
+      </p:sp>
     </p:spTree>
     <p:extLst>
       <p:ext uri="{BB962C8B-B14F-4D97-AF65-F5344CB8AC3E}">
@@ -21005,6 +21785,35 @@
           </a:p>
         </p:txBody>
       </p:sp>
+      <p:sp>
+        <p:nvSpPr>
+          <p:cNvPr id="4" name="Slide Number Placeholder 3">
+            <a:extLst>
+              <a:ext uri="{FF2B5EF4-FFF2-40B4-BE49-F238E27FC236}">
+                <a16:creationId xmlns:a16="http://schemas.microsoft.com/office/drawing/2014/main" id="{A685D3AB-7ADF-DE4E-B760-7D6C21C93E9A}"/>
+              </a:ext>
+            </a:extLst>
+          </p:cNvPr>
+          <p:cNvSpPr>
+            <a:spLocks noGrp="1"/>
+          </p:cNvSpPr>
+          <p:nvPr>
+            <p:ph type="sldNum" sz="quarter" idx="12"/>
+          </p:nvPr>
+        </p:nvSpPr>
+        <p:spPr/>
+        <p:txBody>
+          <a:bodyPr/>
+          <a:lstStyle/>
+          <a:p>
+            <a:fld id="{31DE2C5B-556E-47B8-A792-024C2FCA4ACC}" type="slidenum">
+              <a:rPr lang="en-GB" smtClean="0"/>
+              <a:t>35</a:t>
+            </a:fld>
+            <a:endParaRPr lang="en-GB"/>
+          </a:p>
+        </p:txBody>
+      </p:sp>
     </p:spTree>
     <p:extLst>
       <p:ext uri="{BB962C8B-B14F-4D97-AF65-F5344CB8AC3E}">
@@ -21102,6 +21911,35 @@
           </a:p>
         </p:txBody>
       </p:sp>
+      <p:sp>
+        <p:nvSpPr>
+          <p:cNvPr id="4" name="Slide Number Placeholder 3">
+            <a:extLst>
+              <a:ext uri="{FF2B5EF4-FFF2-40B4-BE49-F238E27FC236}">
+                <a16:creationId xmlns:a16="http://schemas.microsoft.com/office/drawing/2014/main" id="{DA9F2601-12EC-1B4E-8F13-1A6587DF4C6A}"/>
+              </a:ext>
+            </a:extLst>
+          </p:cNvPr>
+          <p:cNvSpPr>
+            <a:spLocks noGrp="1"/>
+          </p:cNvSpPr>
+          <p:nvPr>
+            <p:ph type="sldNum" sz="quarter" idx="12"/>
+          </p:nvPr>
+        </p:nvSpPr>
+        <p:spPr/>
+        <p:txBody>
+          <a:bodyPr/>
+          <a:lstStyle/>
+          <a:p>
+            <a:fld id="{31DE2C5B-556E-47B8-A792-024C2FCA4ACC}" type="slidenum">
+              <a:rPr lang="en-GB" smtClean="0"/>
+              <a:t>36</a:t>
+            </a:fld>
+            <a:endParaRPr lang="en-GB"/>
+          </a:p>
+        </p:txBody>
+      </p:sp>
     </p:spTree>
     <p:extLst>
       <p:ext uri="{BB962C8B-B14F-4D97-AF65-F5344CB8AC3E}">
@@ -21303,6 +22141,35 @@
           </a:p>
         </p:txBody>
       </p:sp>
+      <p:sp>
+        <p:nvSpPr>
+          <p:cNvPr id="4" name="Slide Number Placeholder 3">
+            <a:extLst>
+              <a:ext uri="{FF2B5EF4-FFF2-40B4-BE49-F238E27FC236}">
+                <a16:creationId xmlns:a16="http://schemas.microsoft.com/office/drawing/2014/main" id="{452EC4BD-0471-3748-9E2B-909E0D4B10DB}"/>
+              </a:ext>
+            </a:extLst>
+          </p:cNvPr>
+          <p:cNvSpPr>
+            <a:spLocks noGrp="1"/>
+          </p:cNvSpPr>
+          <p:nvPr>
+            <p:ph type="sldNum" sz="quarter" idx="12"/>
+          </p:nvPr>
+        </p:nvSpPr>
+        <p:spPr/>
+        <p:txBody>
+          <a:bodyPr/>
+          <a:lstStyle/>
+          <a:p>
+            <a:fld id="{31DE2C5B-556E-47B8-A792-024C2FCA4ACC}" type="slidenum">
+              <a:rPr lang="en-GB" smtClean="0"/>
+              <a:t>37</a:t>
+            </a:fld>
+            <a:endParaRPr lang="en-GB"/>
+          </a:p>
+        </p:txBody>
+      </p:sp>
     </p:spTree>
     <p:extLst>
       <p:ext uri="{BB962C8B-B14F-4D97-AF65-F5344CB8AC3E}">
@@ -21410,6 +22277,35 @@
           </a:p>
         </p:txBody>
       </p:sp>
+      <p:sp>
+        <p:nvSpPr>
+          <p:cNvPr id="4" name="Slide Number Placeholder 3">
+            <a:extLst>
+              <a:ext uri="{FF2B5EF4-FFF2-40B4-BE49-F238E27FC236}">
+                <a16:creationId xmlns:a16="http://schemas.microsoft.com/office/drawing/2014/main" id="{A5DAD94D-1F09-934E-96DC-60957E97A22E}"/>
+              </a:ext>
+            </a:extLst>
+          </p:cNvPr>
+          <p:cNvSpPr>
+            <a:spLocks noGrp="1"/>
+          </p:cNvSpPr>
+          <p:nvPr>
+            <p:ph type="sldNum" sz="quarter" idx="12"/>
+          </p:nvPr>
+        </p:nvSpPr>
+        <p:spPr/>
+        <p:txBody>
+          <a:bodyPr/>
+          <a:lstStyle/>
+          <a:p>
+            <a:fld id="{31DE2C5B-556E-47B8-A792-024C2FCA4ACC}" type="slidenum">
+              <a:rPr lang="en-GB" smtClean="0"/>
+              <a:t>38</a:t>
+            </a:fld>
+            <a:endParaRPr lang="en-GB"/>
+          </a:p>
+        </p:txBody>
+      </p:sp>
     </p:spTree>
     <p:extLst>
       <p:ext uri="{BB962C8B-B14F-4D97-AF65-F5344CB8AC3E}">
@@ -21612,6 +22508,35 @@
           </a:p>
         </p:txBody>
       </p:sp>
+      <p:sp>
+        <p:nvSpPr>
+          <p:cNvPr id="4" name="Slide Number Placeholder 3">
+            <a:extLst>
+              <a:ext uri="{FF2B5EF4-FFF2-40B4-BE49-F238E27FC236}">
+                <a16:creationId xmlns:a16="http://schemas.microsoft.com/office/drawing/2014/main" id="{EAA9E2B7-20F7-1C47-8496-8F860DC27102}"/>
+              </a:ext>
+            </a:extLst>
+          </p:cNvPr>
+          <p:cNvSpPr>
+            <a:spLocks noGrp="1"/>
+          </p:cNvSpPr>
+          <p:nvPr>
+            <p:ph type="sldNum" sz="quarter" idx="12"/>
+          </p:nvPr>
+        </p:nvSpPr>
+        <p:spPr/>
+        <p:txBody>
+          <a:bodyPr/>
+          <a:lstStyle/>
+          <a:p>
+            <a:fld id="{31DE2C5B-556E-47B8-A792-024C2FCA4ACC}" type="slidenum">
+              <a:rPr lang="en-GB" smtClean="0"/>
+              <a:t>4</a:t>
+            </a:fld>
+            <a:endParaRPr lang="en-GB"/>
+          </a:p>
+        </p:txBody>
+      </p:sp>
     </p:spTree>
     <p:extLst>
       <p:ext uri="{BB962C8B-B14F-4D97-AF65-F5344CB8AC3E}">
@@ -21754,6 +22679,35 @@
           </a:p>
         </p:txBody>
       </p:sp>
+      <p:sp>
+        <p:nvSpPr>
+          <p:cNvPr id="3" name="Slide Number Placeholder 2">
+            <a:extLst>
+              <a:ext uri="{FF2B5EF4-FFF2-40B4-BE49-F238E27FC236}">
+                <a16:creationId xmlns:a16="http://schemas.microsoft.com/office/drawing/2014/main" id="{5CB49552-EC7B-3445-8FB3-7A2FA4203D37}"/>
+              </a:ext>
+            </a:extLst>
+          </p:cNvPr>
+          <p:cNvSpPr>
+            <a:spLocks noGrp="1"/>
+          </p:cNvSpPr>
+          <p:nvPr>
+            <p:ph type="sldNum" sz="quarter" idx="12"/>
+          </p:nvPr>
+        </p:nvSpPr>
+        <p:spPr/>
+        <p:txBody>
+          <a:bodyPr/>
+          <a:lstStyle/>
+          <a:p>
+            <a:fld id="{31DE2C5B-556E-47B8-A792-024C2FCA4ACC}" type="slidenum">
+              <a:rPr lang="en-GB" smtClean="0"/>
+              <a:t>5</a:t>
+            </a:fld>
+            <a:endParaRPr lang="en-GB"/>
+          </a:p>
+        </p:txBody>
+      </p:sp>
     </p:spTree>
     <p:extLst>
       <p:ext uri="{BB962C8B-B14F-4D97-AF65-F5344CB8AC3E}">
@@ -21955,6 +22909,35 @@
           </a:p>
         </p:txBody>
       </p:sp>
+      <p:sp>
+        <p:nvSpPr>
+          <p:cNvPr id="4" name="Slide Number Placeholder 3">
+            <a:extLst>
+              <a:ext uri="{FF2B5EF4-FFF2-40B4-BE49-F238E27FC236}">
+                <a16:creationId xmlns:a16="http://schemas.microsoft.com/office/drawing/2014/main" id="{15BEBEA5-13FB-0E44-99BF-9F9DA5749E96}"/>
+              </a:ext>
+            </a:extLst>
+          </p:cNvPr>
+          <p:cNvSpPr>
+            <a:spLocks noGrp="1"/>
+          </p:cNvSpPr>
+          <p:nvPr>
+            <p:ph type="sldNum" sz="quarter" idx="12"/>
+          </p:nvPr>
+        </p:nvSpPr>
+        <p:spPr/>
+        <p:txBody>
+          <a:bodyPr/>
+          <a:lstStyle/>
+          <a:p>
+            <a:fld id="{31DE2C5B-556E-47B8-A792-024C2FCA4ACC}" type="slidenum">
+              <a:rPr lang="en-GB" smtClean="0"/>
+              <a:t>6</a:t>
+            </a:fld>
+            <a:endParaRPr lang="en-GB"/>
+          </a:p>
+        </p:txBody>
+      </p:sp>
     </p:spTree>
     <p:extLst>
       <p:ext uri="{BB962C8B-B14F-4D97-AF65-F5344CB8AC3E}">
@@ -22264,6 +23247,35 @@
           </a:fontRef>
         </p:style>
       </p:cxnSp>
+      <p:sp>
+        <p:nvSpPr>
+          <p:cNvPr id="3" name="Slide Number Placeholder 2">
+            <a:extLst>
+              <a:ext uri="{FF2B5EF4-FFF2-40B4-BE49-F238E27FC236}">
+                <a16:creationId xmlns:a16="http://schemas.microsoft.com/office/drawing/2014/main" id="{A461D35E-C19B-1D4B-A56A-A9D111C26A25}"/>
+              </a:ext>
+            </a:extLst>
+          </p:cNvPr>
+          <p:cNvSpPr>
+            <a:spLocks noGrp="1"/>
+          </p:cNvSpPr>
+          <p:nvPr>
+            <p:ph type="sldNum" sz="quarter" idx="12"/>
+          </p:nvPr>
+        </p:nvSpPr>
+        <p:spPr/>
+        <p:txBody>
+          <a:bodyPr/>
+          <a:lstStyle/>
+          <a:p>
+            <a:fld id="{31DE2C5B-556E-47B8-A792-024C2FCA4ACC}" type="slidenum">
+              <a:rPr lang="en-GB" smtClean="0"/>
+              <a:t>7</a:t>
+            </a:fld>
+            <a:endParaRPr lang="en-GB"/>
+          </a:p>
+        </p:txBody>
+      </p:sp>
     </p:spTree>
     <p:extLst>
       <p:ext uri="{BB962C8B-B14F-4D97-AF65-F5344CB8AC3E}">
@@ -23075,6 +24087,35 @@
           </a:p>
         </p:txBody>
       </p:sp>
+      <p:sp>
+        <p:nvSpPr>
+          <p:cNvPr id="4" name="Slide Number Placeholder 3">
+            <a:extLst>
+              <a:ext uri="{FF2B5EF4-FFF2-40B4-BE49-F238E27FC236}">
+                <a16:creationId xmlns:a16="http://schemas.microsoft.com/office/drawing/2014/main" id="{F0882511-6934-BA46-B95A-F13217D7B168}"/>
+              </a:ext>
+            </a:extLst>
+          </p:cNvPr>
+          <p:cNvSpPr>
+            <a:spLocks noGrp="1"/>
+          </p:cNvSpPr>
+          <p:nvPr>
+            <p:ph type="sldNum" sz="quarter" idx="12"/>
+          </p:nvPr>
+        </p:nvSpPr>
+        <p:spPr/>
+        <p:txBody>
+          <a:bodyPr/>
+          <a:lstStyle/>
+          <a:p>
+            <a:fld id="{31DE2C5B-556E-47B8-A792-024C2FCA4ACC}" type="slidenum">
+              <a:rPr lang="en-GB" smtClean="0"/>
+              <a:t>8</a:t>
+            </a:fld>
+            <a:endParaRPr lang="en-GB"/>
+          </a:p>
+        </p:txBody>
+      </p:sp>
     </p:spTree>
     <p:extLst>
       <p:ext uri="{BB962C8B-B14F-4D97-AF65-F5344CB8AC3E}">
@@ -23245,6 +24286,35 @@
           </a:prstGeom>
         </p:spPr>
       </p:pic>
+      <p:sp>
+        <p:nvSpPr>
+          <p:cNvPr id="3" name="Slide Number Placeholder 2">
+            <a:extLst>
+              <a:ext uri="{FF2B5EF4-FFF2-40B4-BE49-F238E27FC236}">
+                <a16:creationId xmlns:a16="http://schemas.microsoft.com/office/drawing/2014/main" id="{79FC22BB-2C97-F449-A673-81511DFCDD2C}"/>
+              </a:ext>
+            </a:extLst>
+          </p:cNvPr>
+          <p:cNvSpPr>
+            <a:spLocks noGrp="1"/>
+          </p:cNvSpPr>
+          <p:nvPr>
+            <p:ph type="sldNum" sz="quarter" idx="12"/>
+          </p:nvPr>
+        </p:nvSpPr>
+        <p:spPr/>
+        <p:txBody>
+          <a:bodyPr/>
+          <a:lstStyle/>
+          <a:p>
+            <a:fld id="{31DE2C5B-556E-47B8-A792-024C2FCA4ACC}" type="slidenum">
+              <a:rPr lang="en-GB" smtClean="0"/>
+              <a:t>9</a:t>
+            </a:fld>
+            <a:endParaRPr lang="en-GB"/>
+          </a:p>
+        </p:txBody>
+      </p:sp>
     </p:spTree>
     <p:extLst>
       <p:ext uri="{BB962C8B-B14F-4D97-AF65-F5344CB8AC3E}">

</xml_diff>

<commit_message>
[master] fixed typo on lesson 6
</commit_message>
<xml_diff>
--- a/lab_06-navigation/lab_06-navigation.pptx
+++ b/lab_06-navigation/lab_06-navigation.pptx
@@ -20536,15 +20536,7 @@
             <a:pPr lvl="1"/>
             <a:r>
               <a:rPr lang="en-US" dirty="0"/>
-              <a:t>Reproduce the app navigation structure on the right using the </a:t>
-            </a:r>
-            <a:r>
-              <a:rPr lang="en-US" b="1" dirty="0"/>
-              <a:t>named routing approach</a:t>
-            </a:r>
-            <a:r>
-              <a:rPr lang="en-US" dirty="0"/>
-              <a:t>.</a:t>
+              <a:t>Reproduce the app navigation structure on the right.</a:t>
             </a:r>
           </a:p>
         </p:txBody>
@@ -21405,7 +21397,7 @@
             <a:pPr lvl="1"/>
             <a:r>
               <a:rPr lang="en-US" dirty="0"/>
-              <a:t>Reproduce the app navigation structure on the right using the named routing approach.</a:t>
+              <a:t>Reproduce the app navigation structure on the right.</a:t>
             </a:r>
           </a:p>
           <a:p>

</xml_diff>

<commit_message>
[master] updated lab 6
</commit_message>
<xml_diff>
--- a/lab_06-navigation/lab_06-navigation.pptx
+++ b/lab_06-navigation/lab_06-navigation.pptx
@@ -240,7 +240,7 @@
           <a:p>
             <a:fld id="{81C4B3FE-0320-8142-8396-5C3025C019EC}" type="datetimeFigureOut">
               <a:rPr lang="en-IT" smtClean="0"/>
-              <a:t>04/04/23</a:t>
+              <a:t>4/7/24</a:t>
             </a:fld>
             <a:endParaRPr lang="en-IT"/>
           </a:p>
@@ -4830,96 +4830,12 @@
           <a:chExt cx="0" cy="0"/>
         </a:xfrm>
       </p:grpSpPr>
-      <p:sp>
-        <p:nvSpPr>
-          <p:cNvPr id="2" name="Title 1">
-            <a:extLst>
-              <a:ext uri="{FF2B5EF4-FFF2-40B4-BE49-F238E27FC236}">
-                <a16:creationId xmlns:a16="http://schemas.microsoft.com/office/drawing/2014/main" id="{122C1E14-0610-FB4E-BCD3-3BA8CADF9D02}"/>
-              </a:ext>
-            </a:extLst>
-          </p:cNvPr>
-          <p:cNvSpPr>
-            <a:spLocks noGrp="1"/>
-          </p:cNvSpPr>
-          <p:nvPr>
-            <p:ph type="title"/>
-          </p:nvPr>
-        </p:nvSpPr>
-        <p:spPr/>
-        <p:txBody>
-          <a:bodyPr/>
-          <a:lstStyle/>
-          <a:p>
-            <a:r>
-              <a:rPr lang="en-IT" dirty="0"/>
-              <a:t>Navigator basics</a:t>
-            </a:r>
-          </a:p>
-        </p:txBody>
-      </p:sp>
-      <p:sp>
-        <p:nvSpPr>
-          <p:cNvPr id="6" name="Content Placeholder 5">
-            <a:extLst>
-              <a:ext uri="{FF2B5EF4-FFF2-40B4-BE49-F238E27FC236}">
-                <a16:creationId xmlns:a16="http://schemas.microsoft.com/office/drawing/2014/main" id="{1CFD16F6-AE87-6245-A265-931E7A6676CD}"/>
-              </a:ext>
-            </a:extLst>
-          </p:cNvPr>
-          <p:cNvSpPr>
-            <a:spLocks noGrp="1"/>
-          </p:cNvSpPr>
-          <p:nvPr>
-            <p:ph idx="1"/>
-          </p:nvPr>
-        </p:nvSpPr>
-        <p:spPr>
-          <a:xfrm>
-            <a:off x="428172" y="1361167"/>
-            <a:ext cx="4625091" cy="4858203"/>
-          </a:xfrm>
-        </p:spPr>
-        <p:txBody>
-          <a:bodyPr>
-            <a:normAutofit fontScale="92500"/>
-          </a:bodyPr>
-          <a:lstStyle/>
-          <a:p>
-            <a:r>
-              <a:rPr lang="en-IT" dirty="0"/>
-              <a:t>First let’s see how to move between two routes</a:t>
-            </a:r>
-          </a:p>
-          <a:p>
-            <a:pPr marL="0" indent="0">
-              <a:buNone/>
-            </a:pPr>
-            <a:endParaRPr lang="en-IT" dirty="0"/>
-          </a:p>
-          <a:p>
-            <a:r>
-              <a:rPr lang="en-IT" dirty="0"/>
-              <a:t>We will start from creating a simple two-routes app where the first route will act as homepage and the second will represent the route that will ideally contain the info on the user profile.</a:t>
-            </a:r>
-          </a:p>
-          <a:p>
-            <a:endParaRPr lang="en-IT" dirty="0"/>
-          </a:p>
-          <a:p>
-            <a:r>
-              <a:rPr lang="en-IT" dirty="0"/>
-              <a:t>When the user taps the button on the homepage it will be directed to the profile page and viceversa</a:t>
-            </a:r>
-          </a:p>
-        </p:txBody>
-      </p:sp>
       <p:pic>
         <p:nvPicPr>
-          <p:cNvPr id="29" name="Picture 28" descr="Graphical user interface, text, application&#10;&#10;Description automatically generated">
-            <a:extLst>
-              <a:ext uri="{FF2B5EF4-FFF2-40B4-BE49-F238E27FC236}">
-                <a16:creationId xmlns:a16="http://schemas.microsoft.com/office/drawing/2014/main" id="{FB8D6A7B-7B21-4C4E-9F90-3DFA0D807A4A}"/>
+          <p:cNvPr id="8" name="Picture 7" descr="A white rectangular object with purple text&#10;&#10;Description automatically generated">
+            <a:extLst>
+              <a:ext uri="{FF2B5EF4-FFF2-40B4-BE49-F238E27FC236}">
+                <a16:creationId xmlns:a16="http://schemas.microsoft.com/office/drawing/2014/main" id="{F5D76B75-9BE7-53D6-1C9C-C1AB40A60162}"/>
               </a:ext>
             </a:extLst>
           </p:cNvPr>
@@ -4942,8 +4858,8 @@
         </p:blipFill>
         <p:spPr>
           <a:xfrm>
-            <a:off x="5227261" y="1200148"/>
-            <a:ext cx="2539587" cy="5495926"/>
+            <a:off x="8932802" y="1225548"/>
+            <a:ext cx="2535675" cy="5495927"/>
           </a:xfrm>
           <a:prstGeom prst="rect">
             <a:avLst/>
@@ -4952,10 +4868,10 @@
       </p:pic>
       <p:pic>
         <p:nvPicPr>
-          <p:cNvPr id="31" name="Picture 30" descr="Graphical user interface, application&#10;&#10;Description automatically generated">
-            <a:extLst>
-              <a:ext uri="{FF2B5EF4-FFF2-40B4-BE49-F238E27FC236}">
-                <a16:creationId xmlns:a16="http://schemas.microsoft.com/office/drawing/2014/main" id="{A7C1F2C1-A3D7-6C4A-8C08-691171715EAE}"/>
+          <p:cNvPr id="5" name="Picture 4" descr="A white rectangular object with purple text&#10;&#10;Description automatically generated">
+            <a:extLst>
+              <a:ext uri="{FF2B5EF4-FFF2-40B4-BE49-F238E27FC236}">
+                <a16:creationId xmlns:a16="http://schemas.microsoft.com/office/drawing/2014/main" id="{2DBCE1F0-13B5-8BC1-5551-C435120EA58E}"/>
               </a:ext>
             </a:extLst>
           </p:cNvPr>
@@ -4978,14 +4894,98 @@
         </p:blipFill>
         <p:spPr>
           <a:xfrm>
-            <a:off x="8961590" y="1200148"/>
-            <a:ext cx="2539586" cy="5495926"/>
+            <a:off x="5034749" y="1225548"/>
+            <a:ext cx="2535675" cy="5495927"/>
           </a:xfrm>
           <a:prstGeom prst="rect">
             <a:avLst/>
           </a:prstGeom>
         </p:spPr>
       </p:pic>
+      <p:sp>
+        <p:nvSpPr>
+          <p:cNvPr id="2" name="Title 1">
+            <a:extLst>
+              <a:ext uri="{FF2B5EF4-FFF2-40B4-BE49-F238E27FC236}">
+                <a16:creationId xmlns:a16="http://schemas.microsoft.com/office/drawing/2014/main" id="{122C1E14-0610-FB4E-BCD3-3BA8CADF9D02}"/>
+              </a:ext>
+            </a:extLst>
+          </p:cNvPr>
+          <p:cNvSpPr>
+            <a:spLocks noGrp="1"/>
+          </p:cNvSpPr>
+          <p:nvPr>
+            <p:ph type="title"/>
+          </p:nvPr>
+        </p:nvSpPr>
+        <p:spPr/>
+        <p:txBody>
+          <a:bodyPr/>
+          <a:lstStyle/>
+          <a:p>
+            <a:r>
+              <a:rPr lang="en-IT" dirty="0"/>
+              <a:t>Navigator basics</a:t>
+            </a:r>
+          </a:p>
+        </p:txBody>
+      </p:sp>
+      <p:sp>
+        <p:nvSpPr>
+          <p:cNvPr id="6" name="Content Placeholder 5">
+            <a:extLst>
+              <a:ext uri="{FF2B5EF4-FFF2-40B4-BE49-F238E27FC236}">
+                <a16:creationId xmlns:a16="http://schemas.microsoft.com/office/drawing/2014/main" id="{1CFD16F6-AE87-6245-A265-931E7A6676CD}"/>
+              </a:ext>
+            </a:extLst>
+          </p:cNvPr>
+          <p:cNvSpPr>
+            <a:spLocks noGrp="1"/>
+          </p:cNvSpPr>
+          <p:nvPr>
+            <p:ph idx="1"/>
+          </p:nvPr>
+        </p:nvSpPr>
+        <p:spPr>
+          <a:xfrm>
+            <a:off x="428172" y="1361167"/>
+            <a:ext cx="4625091" cy="4858203"/>
+          </a:xfrm>
+        </p:spPr>
+        <p:txBody>
+          <a:bodyPr>
+            <a:normAutofit fontScale="92500"/>
+          </a:bodyPr>
+          <a:lstStyle/>
+          <a:p>
+            <a:r>
+              <a:rPr lang="en-IT" dirty="0"/>
+              <a:t>First let’s see how to move between two routes</a:t>
+            </a:r>
+          </a:p>
+          <a:p>
+            <a:pPr marL="0" indent="0">
+              <a:buNone/>
+            </a:pPr>
+            <a:endParaRPr lang="en-IT" dirty="0"/>
+          </a:p>
+          <a:p>
+            <a:r>
+              <a:rPr lang="en-IT" dirty="0"/>
+              <a:t>We will start from creating a simple two-routes app where the first route will act as homepage and the second will represent the route that will ideally contain the info on the user profile.</a:t>
+            </a:r>
+          </a:p>
+          <a:p>
+            <a:endParaRPr lang="en-IT" dirty="0"/>
+          </a:p>
+          <a:p>
+            <a:r>
+              <a:rPr lang="en-IT" dirty="0"/>
+              <a:t>When the user taps the button on the homepage it will be directed to the profile page and viceversa</a:t>
+            </a:r>
+          </a:p>
+        </p:txBody>
+      </p:sp>
       <p:cxnSp>
         <p:nvCxnSpPr>
           <p:cNvPr id="33" name="Straight Arrow Connector 32">
@@ -13800,10 +13800,10 @@
       </p:grpSpPr>
       <p:pic>
         <p:nvPicPr>
-          <p:cNvPr id="7" name="Picture 6" descr="Graphical user interface&#10;&#10;Description automatically generated">
-            <a:extLst>
-              <a:ext uri="{FF2B5EF4-FFF2-40B4-BE49-F238E27FC236}">
-                <a16:creationId xmlns:a16="http://schemas.microsoft.com/office/drawing/2014/main" id="{78E60534-2F58-B74A-BBC3-99782BBBCB45}"/>
+          <p:cNvPr id="10" name="Picture 9" descr="A screenshot of a message&#10;&#10;Description automatically generated">
+            <a:extLst>
+              <a:ext uri="{FF2B5EF4-FFF2-40B4-BE49-F238E27FC236}">
+                <a16:creationId xmlns:a16="http://schemas.microsoft.com/office/drawing/2014/main" id="{AA5C381D-F3BF-82CB-40F3-78AACCCCD87E}"/>
               </a:ext>
             </a:extLst>
           </p:cNvPr>
@@ -13826,8 +13826,8 @@
         </p:blipFill>
         <p:spPr>
           <a:xfrm>
-            <a:off x="9095928" y="1200148"/>
-            <a:ext cx="2533718" cy="5483225"/>
+            <a:off x="8971287" y="1199241"/>
+            <a:ext cx="2536093" cy="5496833"/>
           </a:xfrm>
           <a:prstGeom prst="rect">
             <a:avLst/>
@@ -13836,10 +13836,10 @@
       </p:pic>
       <p:pic>
         <p:nvPicPr>
-          <p:cNvPr id="4" name="Picture 3" descr="Graphical user interface, text, application, chat or text message&#10;&#10;Description automatically generated">
-            <a:extLst>
-              <a:ext uri="{FF2B5EF4-FFF2-40B4-BE49-F238E27FC236}">
-                <a16:creationId xmlns:a16="http://schemas.microsoft.com/office/drawing/2014/main" id="{FDC4A269-85AF-6349-AD98-169D4892E219}"/>
+          <p:cNvPr id="8" name="Picture 7" descr="A screenshot of a phone&#10;&#10;Description automatically generated">
+            <a:extLst>
+              <a:ext uri="{FF2B5EF4-FFF2-40B4-BE49-F238E27FC236}">
+                <a16:creationId xmlns:a16="http://schemas.microsoft.com/office/drawing/2014/main" id="{3ED73714-DF7A-7FC8-B0E0-2008AF0CB12E}"/>
               </a:ext>
             </a:extLst>
           </p:cNvPr>
@@ -13862,8 +13862,8 @@
         </p:blipFill>
         <p:spPr>
           <a:xfrm>
-            <a:off x="5296561" y="1200148"/>
-            <a:ext cx="2539586" cy="5495925"/>
+            <a:off x="5182534" y="1225549"/>
+            <a:ext cx="2535674" cy="5495926"/>
           </a:xfrm>
           <a:prstGeom prst="rect">
             <a:avLst/>
@@ -16925,10 +16925,10 @@
       </p:grpSpPr>
       <p:pic>
         <p:nvPicPr>
-          <p:cNvPr id="10" name="Picture 9" descr="Graphical user interface, text, application, chat or text message&#10;&#10;Description automatically generated">
-            <a:extLst>
-              <a:ext uri="{FF2B5EF4-FFF2-40B4-BE49-F238E27FC236}">
-                <a16:creationId xmlns:a16="http://schemas.microsoft.com/office/drawing/2014/main" id="{58377878-F9F6-3243-BF5A-4535774583F6}"/>
+          <p:cNvPr id="12" name="Picture 11" descr="A screenshot of a phone&#10;&#10;Description automatically generated">
+            <a:extLst>
+              <a:ext uri="{FF2B5EF4-FFF2-40B4-BE49-F238E27FC236}">
+                <a16:creationId xmlns:a16="http://schemas.microsoft.com/office/drawing/2014/main" id="{87F5C41C-5A5E-F29A-0094-972B8616D407}"/>
               </a:ext>
             </a:extLst>
           </p:cNvPr>
@@ -16951,8 +16951,8 @@
         </p:blipFill>
         <p:spPr>
           <a:xfrm>
-            <a:off x="9224241" y="1187445"/>
-            <a:ext cx="2539587" cy="5495928"/>
+            <a:off x="5216272" y="1187447"/>
+            <a:ext cx="2535674" cy="5495926"/>
           </a:xfrm>
           <a:prstGeom prst="rect">
             <a:avLst/>
@@ -16961,10 +16961,10 @@
       </p:pic>
       <p:pic>
         <p:nvPicPr>
-          <p:cNvPr id="5" name="Picture 4" descr="Graphical user interface, text, application, chat or text message&#10;&#10;Description automatically generated">
-            <a:extLst>
-              <a:ext uri="{FF2B5EF4-FFF2-40B4-BE49-F238E27FC236}">
-                <a16:creationId xmlns:a16="http://schemas.microsoft.com/office/drawing/2014/main" id="{0D9E23EF-FFDA-0542-9B07-DB092EB5411A}"/>
+          <p:cNvPr id="9" name="Picture 8" descr="A white rectangular object with purple text&#10;&#10;Description automatically generated">
+            <a:extLst>
+              <a:ext uri="{FF2B5EF4-FFF2-40B4-BE49-F238E27FC236}">
+                <a16:creationId xmlns:a16="http://schemas.microsoft.com/office/drawing/2014/main" id="{2F859568-9F08-21F8-7BDE-BDE4A3E63942}"/>
               </a:ext>
             </a:extLst>
           </p:cNvPr>
@@ -16987,8 +16987,8 @@
         </p:blipFill>
         <p:spPr>
           <a:xfrm>
-            <a:off x="5283615" y="1187448"/>
-            <a:ext cx="2539586" cy="5495925"/>
+            <a:off x="9228154" y="1187447"/>
+            <a:ext cx="2535674" cy="5495925"/>
           </a:xfrm>
           <a:prstGeom prst="rect">
             <a:avLst/>
@@ -21356,110 +21356,131 @@
         </p:nvSpPr>
         <p:spPr>
           <a:xfrm>
-            <a:off x="428172" y="1361167"/>
-            <a:ext cx="7504209" cy="5334907"/>
+            <a:off x="0" y="1361167"/>
+            <a:ext cx="6280043" cy="5334907"/>
           </a:xfrm>
         </p:spPr>
         <p:txBody>
           <a:bodyPr>
-            <a:normAutofit lnSpcReduction="10000"/>
+            <a:normAutofit/>
           </a:bodyPr>
           <a:lstStyle/>
           <a:p>
             <a:r>
-              <a:rPr lang="en-GB" dirty="0"/>
+              <a:rPr lang="en-GB" sz="1800" dirty="0"/>
               <a:t>Exercise 06.04 (medium)</a:t>
             </a:r>
           </a:p>
           <a:p>
-            <a:endParaRPr lang="en-GB" dirty="0"/>
+            <a:endParaRPr lang="en-GB" sz="1800" dirty="0"/>
           </a:p>
           <a:p>
             <a:pPr lvl="1"/>
             <a:r>
-              <a:rPr lang="en-US" dirty="0"/>
+              <a:rPr lang="en-US" sz="1600" dirty="0"/>
               <a:t>Create a new project ‘</a:t>
             </a:r>
             <a:r>
-              <a:rPr lang="en-US" dirty="0" err="1"/>
+              <a:rPr lang="en-US" sz="1600" dirty="0" err="1"/>
               <a:t>login_flow</a:t>
             </a:r>
             <a:r>
-              <a:rPr lang="en-US" dirty="0"/>
+              <a:rPr lang="en-US" sz="1600" dirty="0"/>
               <a:t>’</a:t>
             </a:r>
           </a:p>
           <a:p>
             <a:pPr lvl="1"/>
-            <a:endParaRPr lang="en-US" dirty="0"/>
+            <a:r>
+              <a:rPr lang="en-US" sz="1600" dirty="0"/>
+              <a:t>Reproduce the app navigation structure on the right.</a:t>
+            </a:r>
           </a:p>
           <a:p>
             <a:pPr lvl="1"/>
             <a:r>
-              <a:rPr lang="en-US" dirty="0"/>
-              <a:t>Reproduce the app navigation structure on the right.</a:t>
+              <a:rPr lang="en-US" sz="1600" dirty="0"/>
+              <a:t>The login page consists of a form with two textboxes (one for the username and the other for the password) and a button.</a:t>
             </a:r>
           </a:p>
           <a:p>
             <a:pPr lvl="1"/>
-            <a:endParaRPr lang="en-US" dirty="0"/>
+            <a:r>
+              <a:rPr lang="en-US" sz="1600" dirty="0"/>
+              <a:t>When the user types “</a:t>
+            </a:r>
+            <a:r>
+              <a:rPr lang="en-US" sz="1600" dirty="0" err="1"/>
+              <a:t>bug@expert.com</a:t>
+            </a:r>
+            <a:r>
+              <a:rPr lang="en-US" sz="1600" dirty="0"/>
+              <a:t>” in the username textbox and “5TrNgP5Wd” in the password textbox, and taps the button, the user is redirected to the Homepage. If the credentials are wrong, a </a:t>
+            </a:r>
+            <a:r>
+              <a:rPr lang="en-US" sz="1600" dirty="0" err="1">
+                <a:latin typeface="Courier" pitchFamily="2" charset="0"/>
+              </a:rPr>
+              <a:t>ScaffoldMessenger</a:t>
+            </a:r>
+            <a:r>
+              <a:rPr lang="en-US" sz="1600" dirty="0"/>
+              <a:t> is showed for 2 seconds saying “Wrong credentials”.</a:t>
+            </a:r>
           </a:p>
           <a:p>
             <a:pPr lvl="1"/>
-            <a:r>
-              <a:rPr lang="en-US" dirty="0"/>
-              <a:t>The login page consists of a form with two textboxes (one for the username and the other for the password) and a button. Hint: you can use the widgets</a:t>
-            </a:r>
+            <a:endParaRPr lang="en-US" sz="1600" dirty="0"/>
           </a:p>
           <a:p>
             <a:pPr lvl="1"/>
-            <a:endParaRPr lang="en-US" dirty="0"/>
+            <a:r>
+              <a:rPr lang="en-US" sz="1600" b="1" dirty="0"/>
+              <a:t>Hint #1</a:t>
+            </a:r>
+            <a:r>
+              <a:rPr lang="en-US" sz="1600" dirty="0"/>
+              <a:t>: you need to instantiate a </a:t>
+            </a:r>
+            <a:r>
+              <a:rPr lang="en-US" sz="1600" dirty="0" err="1"/>
+              <a:t>TextEditingController</a:t>
+            </a:r>
+            <a:r>
+              <a:rPr lang="en-US" sz="1600" dirty="0"/>
+              <a:t> as state variable</a:t>
+            </a:r>
           </a:p>
           <a:p>
             <a:pPr lvl="1"/>
             <a:r>
-              <a:rPr lang="en-US" dirty="0"/>
-              <a:t>When the user types “</a:t>
-            </a:r>
-            <a:r>
-              <a:rPr lang="en-US" dirty="0" err="1"/>
-              <a:t>bug@expert.com</a:t>
-            </a:r>
-            <a:r>
-              <a:rPr lang="en-US" dirty="0"/>
-              <a:t>” in the username textbox and “5TrNgP5Wd” in the password textbox, and taps the button, the user is redirected to the Homepage. If the credentials are wrong, a </a:t>
-            </a:r>
-            <a:r>
-              <a:rPr lang="en-US" dirty="0" err="1">
-                <a:latin typeface="Courier" pitchFamily="2" charset="0"/>
-              </a:rPr>
-              <a:t>ScaffoldMessenger</a:t>
-            </a:r>
-            <a:r>
-              <a:rPr lang="en-US" dirty="0"/>
-              <a:t> is showed for 2 seconds saying “Wrong credentials”.   </a:t>
+              <a:rPr lang="en-US" sz="1600" b="1" dirty="0"/>
+              <a:t>Hint #2</a:t>
+            </a:r>
+            <a:r>
+              <a:rPr lang="en-US" sz="1600" dirty="0"/>
+              <a:t>: you need to use a </a:t>
+            </a:r>
+            <a:r>
+              <a:rPr lang="en-US" sz="1600" dirty="0" err="1"/>
+              <a:t>TextField</a:t>
+            </a:r>
+            <a:r>
+              <a:rPr lang="en-US" sz="1600" dirty="0"/>
+              <a:t> in you UI</a:t>
             </a:r>
           </a:p>
           <a:p>
             <a:pPr lvl="1"/>
-            <a:endParaRPr lang="en-US" dirty="0"/>
-          </a:p>
-          <a:p>
-            <a:pPr lvl="1"/>
-            <a:r>
-              <a:rPr lang="en-US" dirty="0"/>
-              <a:t>The </a:t>
-            </a:r>
-            <a:r>
-              <a:rPr lang="en-US" dirty="0" err="1">
-                <a:latin typeface="Courier" pitchFamily="2" charset="0"/>
-              </a:rPr>
-              <a:t>HomePage</a:t>
-            </a:r>
-            <a:r>
-              <a:rPr lang="en-US" dirty="0"/>
-              <a:t> must show the provided username.</a:t>
-            </a:r>
+            <a:r>
+              <a:rPr lang="en-US" sz="1600" b="1" dirty="0"/>
+              <a:t>Hint #3</a:t>
+            </a:r>
+            <a:r>
+              <a:rPr lang="en-US" sz="1600" dirty="0"/>
+              <a:t>: then, you can access to the text value using</a:t>
+            </a:r>
+            <a:endParaRPr lang="en-US" sz="1600" b="1" dirty="0"/>
           </a:p>
         </p:txBody>
       </p:sp>
@@ -21477,7 +21498,7 @@
         </p:nvSpPr>
         <p:spPr>
           <a:xfrm>
-            <a:off x="8708250" y="2009026"/>
+            <a:off x="6734638" y="1222049"/>
             <a:ext cx="1760256" cy="452175"/>
           </a:xfrm>
           <a:prstGeom prst="rect">
@@ -21527,7 +21548,7 @@
         </p:nvSpPr>
         <p:spPr>
           <a:xfrm>
-            <a:off x="8708250" y="2944961"/>
+            <a:off x="6734638" y="2157984"/>
             <a:ext cx="1760256" cy="452175"/>
           </a:xfrm>
           <a:prstGeom prst="rect">
@@ -21579,7 +21600,7 @@
         </p:nvCxnSpPr>
         <p:spPr>
           <a:xfrm flipV="1">
-            <a:off x="9294990" y="2461202"/>
+            <a:off x="7321378" y="1674225"/>
             <a:ext cx="0" cy="483759"/>
           </a:xfrm>
           <a:prstGeom prst="straightConnector1">
@@ -21620,7 +21641,7 @@
         </p:nvCxnSpPr>
         <p:spPr>
           <a:xfrm>
-            <a:off x="9948133" y="2461201"/>
+            <a:off x="7974521" y="1674224"/>
             <a:ext cx="0" cy="483761"/>
           </a:xfrm>
           <a:prstGeom prst="straightConnector1">
@@ -21674,6 +21695,482 @@
           </a:p>
         </p:txBody>
       </p:sp>
+      <p:sp>
+        <p:nvSpPr>
+          <p:cNvPr id="8" name="TextBox 7">
+            <a:extLst>
+              <a:ext uri="{FF2B5EF4-FFF2-40B4-BE49-F238E27FC236}">
+                <a16:creationId xmlns:a16="http://schemas.microsoft.com/office/drawing/2014/main" id="{2670A44A-55CA-337C-30FB-66C6F0D5FE27}"/>
+              </a:ext>
+            </a:extLst>
+          </p:cNvPr>
+          <p:cNvSpPr txBox="1"/>
+          <p:nvPr/>
+        </p:nvSpPr>
+        <p:spPr>
+          <a:xfrm>
+            <a:off x="6562398" y="4028620"/>
+            <a:ext cx="3569362" cy="1754326"/>
+          </a:xfrm>
+          <a:prstGeom prst="rect">
+            <a:avLst/>
+          </a:prstGeom>
+          <a:noFill/>
+        </p:spPr>
+        <p:txBody>
+          <a:bodyPr wrap="square">
+            <a:spAutoFit/>
+          </a:bodyPr>
+          <a:lstStyle/>
+          <a:p>
+            <a:r>
+              <a:rPr lang="en-US" sz="1200" b="0" dirty="0" err="1">
+                <a:effectLst/>
+                <a:latin typeface="Menlo" panose="020B0609030804020204" pitchFamily="49" charset="0"/>
+              </a:rPr>
+              <a:t>TextField</a:t>
+            </a:r>
+            <a:r>
+              <a:rPr lang="en-US" sz="1200" b="0" dirty="0">
+                <a:effectLst/>
+                <a:latin typeface="Menlo" panose="020B0609030804020204" pitchFamily="49" charset="0"/>
+              </a:rPr>
+              <a:t>(</a:t>
+            </a:r>
+          </a:p>
+          <a:p>
+            <a:r>
+              <a:rPr lang="en-US" sz="1200" b="0" dirty="0">
+                <a:effectLst/>
+                <a:latin typeface="Menlo" panose="020B0609030804020204" pitchFamily="49" charset="0"/>
+              </a:rPr>
+              <a:t>  </a:t>
+            </a:r>
+            <a:r>
+              <a:rPr lang="en-US" sz="1200" b="0" dirty="0" err="1">
+                <a:effectLst/>
+                <a:latin typeface="Menlo" panose="020B0609030804020204" pitchFamily="49" charset="0"/>
+              </a:rPr>
+              <a:t>obscureText</a:t>
+            </a:r>
+            <a:r>
+              <a:rPr lang="en-US" sz="1200" b="0" dirty="0">
+                <a:effectLst/>
+                <a:latin typeface="Menlo" panose="020B0609030804020204" pitchFamily="49" charset="0"/>
+              </a:rPr>
+              <a:t>: true,</a:t>
+            </a:r>
+          </a:p>
+          <a:p>
+            <a:r>
+              <a:rPr lang="en-US" sz="1200" b="0" dirty="0">
+                <a:effectLst/>
+                <a:latin typeface="Menlo" panose="020B0609030804020204" pitchFamily="49" charset="0"/>
+              </a:rPr>
+              <a:t>  controller: </a:t>
+            </a:r>
+            <a:r>
+              <a:rPr lang="en-US" sz="1200" b="0" dirty="0" err="1">
+                <a:effectLst/>
+                <a:latin typeface="Menlo" panose="020B0609030804020204" pitchFamily="49" charset="0"/>
+              </a:rPr>
+              <a:t>passwordController</a:t>
+            </a:r>
+            <a:r>
+              <a:rPr lang="en-US" sz="1200" b="0" dirty="0">
+                <a:effectLst/>
+                <a:latin typeface="Menlo" panose="020B0609030804020204" pitchFamily="49" charset="0"/>
+              </a:rPr>
+              <a:t>,</a:t>
+            </a:r>
+          </a:p>
+          <a:p>
+            <a:r>
+              <a:rPr lang="en-US" sz="1200" b="0" dirty="0">
+                <a:effectLst/>
+                <a:latin typeface="Menlo" panose="020B0609030804020204" pitchFamily="49" charset="0"/>
+              </a:rPr>
+              <a:t>  decoration: </a:t>
+            </a:r>
+            <a:r>
+              <a:rPr lang="en-US" sz="1200" b="0" dirty="0" err="1">
+                <a:effectLst/>
+                <a:latin typeface="Menlo" panose="020B0609030804020204" pitchFamily="49" charset="0"/>
+              </a:rPr>
+              <a:t>InputDecoration</a:t>
+            </a:r>
+            <a:r>
+              <a:rPr lang="en-US" sz="1200" b="0" dirty="0">
+                <a:effectLst/>
+                <a:latin typeface="Menlo" panose="020B0609030804020204" pitchFamily="49" charset="0"/>
+              </a:rPr>
+              <a:t>(</a:t>
+            </a:r>
+          </a:p>
+          <a:p>
+            <a:r>
+              <a:rPr lang="en-US" sz="1200" b="0" dirty="0">
+                <a:effectLst/>
+                <a:latin typeface="Menlo" panose="020B0609030804020204" pitchFamily="49" charset="0"/>
+              </a:rPr>
+              <a:t>    border: </a:t>
+            </a:r>
+            <a:r>
+              <a:rPr lang="en-US" sz="1200" b="0" dirty="0" err="1">
+                <a:effectLst/>
+                <a:latin typeface="Menlo" panose="020B0609030804020204" pitchFamily="49" charset="0"/>
+              </a:rPr>
+              <a:t>OutlineInputBorder</a:t>
+            </a:r>
+            <a:r>
+              <a:rPr lang="en-US" sz="1200" b="0" dirty="0">
+                <a:effectLst/>
+                <a:latin typeface="Menlo" panose="020B0609030804020204" pitchFamily="49" charset="0"/>
+              </a:rPr>
+              <a:t>(),</a:t>
+            </a:r>
+          </a:p>
+          <a:p>
+            <a:r>
+              <a:rPr lang="en-US" sz="1200" b="0" dirty="0">
+                <a:effectLst/>
+                <a:latin typeface="Menlo" panose="020B0609030804020204" pitchFamily="49" charset="0"/>
+              </a:rPr>
+              <a:t>    </a:t>
+            </a:r>
+            <a:r>
+              <a:rPr lang="en-US" sz="1200" b="0" dirty="0" err="1">
+                <a:effectLst/>
+                <a:latin typeface="Menlo" panose="020B0609030804020204" pitchFamily="49" charset="0"/>
+              </a:rPr>
+              <a:t>labelText</a:t>
+            </a:r>
+            <a:r>
+              <a:rPr lang="en-US" sz="1200" b="0" dirty="0">
+                <a:effectLst/>
+                <a:latin typeface="Menlo" panose="020B0609030804020204" pitchFamily="49" charset="0"/>
+              </a:rPr>
+              <a:t>: 'Password’,</a:t>
+            </a:r>
+          </a:p>
+          <a:p>
+            <a:r>
+              <a:rPr lang="en-US" sz="1200" b="0" dirty="0">
+                <a:effectLst/>
+                <a:latin typeface="Menlo" panose="020B0609030804020204" pitchFamily="49" charset="0"/>
+              </a:rPr>
+              <a:t>    </a:t>
+            </a:r>
+            <a:r>
+              <a:rPr lang="en-US" sz="1200" b="0" dirty="0" err="1">
+                <a:effectLst/>
+                <a:latin typeface="Menlo" panose="020B0609030804020204" pitchFamily="49" charset="0"/>
+              </a:rPr>
+              <a:t>hintText</a:t>
+            </a:r>
+            <a:r>
+              <a:rPr lang="en-US" sz="1200" b="0" dirty="0">
+                <a:effectLst/>
+                <a:latin typeface="Menlo" panose="020B0609030804020204" pitchFamily="49" charset="0"/>
+              </a:rPr>
+              <a:t>: 'Enter password’</a:t>
+            </a:r>
+          </a:p>
+          <a:p>
+            <a:r>
+              <a:rPr lang="en-US" sz="1200" b="0" dirty="0">
+                <a:effectLst/>
+                <a:latin typeface="Menlo" panose="020B0609030804020204" pitchFamily="49" charset="0"/>
+              </a:rPr>
+              <a:t>  ),</a:t>
+            </a:r>
+          </a:p>
+          <a:p>
+            <a:r>
+              <a:rPr lang="en-US" sz="1200" b="0" dirty="0">
+                <a:effectLst/>
+                <a:latin typeface="Menlo" panose="020B0609030804020204" pitchFamily="49" charset="0"/>
+              </a:rPr>
+              <a:t>),</a:t>
+            </a:r>
+          </a:p>
+        </p:txBody>
+      </p:sp>
+      <p:sp>
+        <p:nvSpPr>
+          <p:cNvPr id="10" name="TextBox 9">
+            <a:extLst>
+              <a:ext uri="{FF2B5EF4-FFF2-40B4-BE49-F238E27FC236}">
+                <a16:creationId xmlns:a16="http://schemas.microsoft.com/office/drawing/2014/main" id="{834CF76B-7C7A-22CB-FDE0-7BC6AEA66B7C}"/>
+              </a:ext>
+            </a:extLst>
+          </p:cNvPr>
+          <p:cNvSpPr txBox="1"/>
+          <p:nvPr/>
+        </p:nvSpPr>
+        <p:spPr>
+          <a:xfrm>
+            <a:off x="6562398" y="2996224"/>
+            <a:ext cx="3405816" cy="646331"/>
+          </a:xfrm>
+          <a:prstGeom prst="rect">
+            <a:avLst/>
+          </a:prstGeom>
+          <a:noFill/>
+        </p:spPr>
+        <p:txBody>
+          <a:bodyPr wrap="square">
+            <a:spAutoFit/>
+          </a:bodyPr>
+          <a:lstStyle/>
+          <a:p>
+            <a:r>
+              <a:rPr lang="en-US" sz="1200" b="0" dirty="0" err="1">
+                <a:effectLst/>
+                <a:latin typeface="Menlo" panose="020B0609030804020204" pitchFamily="49" charset="0"/>
+              </a:rPr>
+              <a:t>TextEditingController</a:t>
+            </a:r>
+            <a:r>
+              <a:rPr lang="en-US" sz="1200" b="0" dirty="0">
+                <a:effectLst/>
+                <a:latin typeface="Menlo" panose="020B0609030804020204" pitchFamily="49" charset="0"/>
+              </a:rPr>
+              <a:t> </a:t>
+            </a:r>
+            <a:r>
+              <a:rPr lang="en-US" sz="1200" b="0" dirty="0" err="1">
+                <a:effectLst/>
+                <a:latin typeface="Menlo" panose="020B0609030804020204" pitchFamily="49" charset="0"/>
+              </a:rPr>
+              <a:t>passwordController</a:t>
+            </a:r>
+            <a:r>
+              <a:rPr lang="en-US" sz="1200" b="0" dirty="0">
+                <a:effectLst/>
+                <a:latin typeface="Menlo" panose="020B0609030804020204" pitchFamily="49" charset="0"/>
+              </a:rPr>
+              <a:t> = </a:t>
+            </a:r>
+            <a:r>
+              <a:rPr lang="en-US" sz="1200" b="0" dirty="0" err="1">
+                <a:effectLst/>
+                <a:latin typeface="Menlo" panose="020B0609030804020204" pitchFamily="49" charset="0"/>
+              </a:rPr>
+              <a:t>TextEditingController</a:t>
+            </a:r>
+            <a:r>
+              <a:rPr lang="en-US" sz="1200" b="0" dirty="0">
+                <a:effectLst/>
+                <a:latin typeface="Menlo" panose="020B0609030804020204" pitchFamily="49" charset="0"/>
+              </a:rPr>
+              <a:t>();</a:t>
+            </a:r>
+          </a:p>
+        </p:txBody>
+      </p:sp>
+      <p:pic>
+        <p:nvPicPr>
+          <p:cNvPr id="13" name="Picture 12" descr="A screenshot of a login form&#10;&#10;Description automatically generated">
+            <a:extLst>
+              <a:ext uri="{FF2B5EF4-FFF2-40B4-BE49-F238E27FC236}">
+                <a16:creationId xmlns:a16="http://schemas.microsoft.com/office/drawing/2014/main" id="{6F79062D-F922-359C-0310-433D26B8611F}"/>
+              </a:ext>
+            </a:extLst>
+          </p:cNvPr>
+          <p:cNvPicPr>
+            <a:picLocks noChangeAspect="1"/>
+          </p:cNvPicPr>
+          <p:nvPr/>
+        </p:nvPicPr>
+        <p:blipFill>
+          <a:blip r:embed="rId2">
+            <a:extLst>
+              <a:ext uri="{28A0092B-C50C-407E-A947-70E740481C1C}">
+                <a14:useLocalDpi xmlns:a14="http://schemas.microsoft.com/office/drawing/2010/main" val="0"/>
+              </a:ext>
+            </a:extLst>
+          </a:blip>
+          <a:stretch>
+            <a:fillRect/>
+          </a:stretch>
+        </p:blipFill>
+        <p:spPr>
+          <a:xfrm>
+            <a:off x="9968214" y="1677109"/>
+            <a:ext cx="1929336" cy="4181724"/>
+          </a:xfrm>
+          <a:prstGeom prst="rect">
+            <a:avLst/>
+          </a:prstGeom>
+        </p:spPr>
+      </p:pic>
+      <p:cxnSp>
+        <p:nvCxnSpPr>
+          <p:cNvPr id="15" name="Straight Arrow Connector 14">
+            <a:extLst>
+              <a:ext uri="{FF2B5EF4-FFF2-40B4-BE49-F238E27FC236}">
+                <a16:creationId xmlns:a16="http://schemas.microsoft.com/office/drawing/2014/main" id="{3220D260-183F-7EB5-5D8D-ECF4A46B049E}"/>
+              </a:ext>
+            </a:extLst>
+          </p:cNvPr>
+          <p:cNvCxnSpPr>
+            <a:cxnSpLocks/>
+          </p:cNvCxnSpPr>
+          <p:nvPr/>
+        </p:nvCxnSpPr>
+        <p:spPr>
+          <a:xfrm flipV="1">
+            <a:off x="5878286" y="3642555"/>
+            <a:ext cx="684112" cy="1214453"/>
+          </a:xfrm>
+          <a:prstGeom prst="straightConnector1">
+            <a:avLst/>
+          </a:prstGeom>
+          <a:ln w="38100">
+            <a:tailEnd type="triangle"/>
+          </a:ln>
+        </p:spPr>
+        <p:style>
+          <a:lnRef idx="1">
+            <a:schemeClr val="accent6"/>
+          </a:lnRef>
+          <a:fillRef idx="0">
+            <a:schemeClr val="accent6"/>
+          </a:fillRef>
+          <a:effectRef idx="0">
+            <a:schemeClr val="accent6"/>
+          </a:effectRef>
+          <a:fontRef idx="minor">
+            <a:schemeClr val="tx1"/>
+          </a:fontRef>
+        </p:style>
+      </p:cxnSp>
+      <p:cxnSp>
+        <p:nvCxnSpPr>
+          <p:cNvPr id="18" name="Straight Arrow Connector 17">
+            <a:extLst>
+              <a:ext uri="{FF2B5EF4-FFF2-40B4-BE49-F238E27FC236}">
+                <a16:creationId xmlns:a16="http://schemas.microsoft.com/office/drawing/2014/main" id="{E30EE6B1-272E-BE8C-6826-0F34F965EB58}"/>
+              </a:ext>
+            </a:extLst>
+          </p:cNvPr>
+          <p:cNvCxnSpPr>
+            <a:cxnSpLocks/>
+          </p:cNvCxnSpPr>
+          <p:nvPr/>
+        </p:nvCxnSpPr>
+        <p:spPr>
+          <a:xfrm flipV="1">
+            <a:off x="4999512" y="5201392"/>
+            <a:ext cx="1562886" cy="201881"/>
+          </a:xfrm>
+          <a:prstGeom prst="straightConnector1">
+            <a:avLst/>
+          </a:prstGeom>
+          <a:ln w="38100">
+            <a:tailEnd type="triangle"/>
+          </a:ln>
+        </p:spPr>
+        <p:style>
+          <a:lnRef idx="1">
+            <a:schemeClr val="accent6"/>
+          </a:lnRef>
+          <a:fillRef idx="0">
+            <a:schemeClr val="accent6"/>
+          </a:fillRef>
+          <a:effectRef idx="0">
+            <a:schemeClr val="accent6"/>
+          </a:effectRef>
+          <a:fontRef idx="minor">
+            <a:schemeClr val="tx1"/>
+          </a:fontRef>
+        </p:style>
+      </p:cxnSp>
+      <p:sp>
+        <p:nvSpPr>
+          <p:cNvPr id="22" name="TextBox 21">
+            <a:extLst>
+              <a:ext uri="{FF2B5EF4-FFF2-40B4-BE49-F238E27FC236}">
+                <a16:creationId xmlns:a16="http://schemas.microsoft.com/office/drawing/2014/main" id="{8BC1F25C-8FC7-73F6-1EED-DCDBAED21024}"/>
+              </a:ext>
+            </a:extLst>
+          </p:cNvPr>
+          <p:cNvSpPr txBox="1"/>
+          <p:nvPr/>
+        </p:nvSpPr>
+        <p:spPr>
+          <a:xfrm>
+            <a:off x="6602276" y="6084157"/>
+            <a:ext cx="3785235" cy="307777"/>
+          </a:xfrm>
+          <a:prstGeom prst="rect">
+            <a:avLst/>
+          </a:prstGeom>
+          <a:noFill/>
+        </p:spPr>
+        <p:txBody>
+          <a:bodyPr wrap="square">
+            <a:spAutoFit/>
+          </a:bodyPr>
+          <a:lstStyle/>
+          <a:p>
+            <a:r>
+              <a:rPr lang="en-US" sz="1400" b="0" dirty="0" err="1">
+                <a:effectLst/>
+                <a:latin typeface="Menlo" panose="020B0609030804020204" pitchFamily="49" charset="0"/>
+              </a:rPr>
+              <a:t>passwordController.text</a:t>
+            </a:r>
+            <a:endParaRPr lang="en-US" sz="1400" b="0" dirty="0">
+              <a:effectLst/>
+              <a:latin typeface="Menlo" panose="020B0609030804020204" pitchFamily="49" charset="0"/>
+            </a:endParaRPr>
+          </a:p>
+        </p:txBody>
+      </p:sp>
+      <p:cxnSp>
+        <p:nvCxnSpPr>
+          <p:cNvPr id="23" name="Straight Arrow Connector 22">
+            <a:extLst>
+              <a:ext uri="{FF2B5EF4-FFF2-40B4-BE49-F238E27FC236}">
+                <a16:creationId xmlns:a16="http://schemas.microsoft.com/office/drawing/2014/main" id="{70CB6D4B-1C3D-3A0E-9345-DCA48D6E5AD0}"/>
+              </a:ext>
+            </a:extLst>
+          </p:cNvPr>
+          <p:cNvCxnSpPr>
+            <a:cxnSpLocks/>
+            <a:endCxn id="22" idx="1"/>
+          </p:cNvCxnSpPr>
+          <p:nvPr/>
+        </p:nvCxnSpPr>
+        <p:spPr>
+          <a:xfrm>
+            <a:off x="5486400" y="5719949"/>
+            <a:ext cx="1115876" cy="518097"/>
+          </a:xfrm>
+          <a:prstGeom prst="straightConnector1">
+            <a:avLst/>
+          </a:prstGeom>
+          <a:ln w="38100">
+            <a:tailEnd type="triangle"/>
+          </a:ln>
+        </p:spPr>
+        <p:style>
+          <a:lnRef idx="1">
+            <a:schemeClr val="accent6"/>
+          </a:lnRef>
+          <a:fillRef idx="0">
+            <a:schemeClr val="accent6"/>
+          </a:fillRef>
+          <a:effectRef idx="0">
+            <a:schemeClr val="accent6"/>
+          </a:effectRef>
+          <a:fontRef idx="minor">
+            <a:schemeClr val="tx1"/>
+          </a:fontRef>
+        </p:style>
+      </p:cxnSp>
     </p:spTree>
     <p:extLst>
       <p:ext uri="{BB962C8B-B14F-4D97-AF65-F5344CB8AC3E}">
@@ -21865,110 +22362,12 @@
           <a:chExt cx="0" cy="0"/>
         </a:xfrm>
       </p:grpSpPr>
-      <p:sp>
-        <p:nvSpPr>
-          <p:cNvPr id="2" name="Title 1">
-            <a:extLst>
-              <a:ext uri="{FF2B5EF4-FFF2-40B4-BE49-F238E27FC236}">
-                <a16:creationId xmlns:a16="http://schemas.microsoft.com/office/drawing/2014/main" id="{122C1E14-0610-FB4E-BCD3-3BA8CADF9D02}"/>
-              </a:ext>
-            </a:extLst>
-          </p:cNvPr>
-          <p:cNvSpPr>
-            <a:spLocks noGrp="1"/>
-          </p:cNvSpPr>
-          <p:nvPr>
-            <p:ph type="title"/>
-          </p:nvPr>
-        </p:nvSpPr>
-        <p:spPr/>
-        <p:txBody>
-          <a:bodyPr/>
-          <a:lstStyle/>
-          <a:p>
-            <a:r>
-              <a:rPr lang="en-IT" dirty="0"/>
-              <a:t>Exercise</a:t>
-            </a:r>
-          </a:p>
-        </p:txBody>
-      </p:sp>
-      <p:sp>
-        <p:nvSpPr>
-          <p:cNvPr id="3" name="Content Placeholder 2">
-            <a:extLst>
-              <a:ext uri="{FF2B5EF4-FFF2-40B4-BE49-F238E27FC236}">
-                <a16:creationId xmlns:a16="http://schemas.microsoft.com/office/drawing/2014/main" id="{8962CCAC-9D70-C543-BBE0-822B6CB5F5CB}"/>
-              </a:ext>
-            </a:extLst>
-          </p:cNvPr>
-          <p:cNvSpPr>
-            <a:spLocks noGrp="1"/>
-          </p:cNvSpPr>
-          <p:nvPr>
-            <p:ph idx="1"/>
-          </p:nvPr>
-        </p:nvSpPr>
-        <p:spPr>
-          <a:xfrm>
-            <a:off x="428173" y="1361167"/>
-            <a:ext cx="3835217" cy="5334907"/>
-          </a:xfrm>
-        </p:spPr>
-        <p:txBody>
-          <a:bodyPr>
-            <a:normAutofit/>
-          </a:bodyPr>
-          <a:lstStyle/>
-          <a:p>
-            <a:r>
-              <a:rPr lang="en-GB" dirty="0"/>
-              <a:t>Exercise 06.05 (medium) </a:t>
-            </a:r>
-          </a:p>
-          <a:p>
-            <a:endParaRPr lang="en-GB" dirty="0"/>
-          </a:p>
-          <a:p>
-            <a:pPr lvl="1"/>
-            <a:r>
-              <a:rPr lang="en-US" dirty="0"/>
-              <a:t>Follow the cookbook </a:t>
-            </a:r>
-            <a:r>
-              <a:rPr lang="en-US" dirty="0">
-                <a:hlinkClick r:id="rId2"/>
-              </a:rPr>
-              <a:t>https://docs.flutter.dev/cookbook/navigation/passing-data</a:t>
-            </a:r>
-            <a:r>
-              <a:rPr lang="en-US" dirty="0"/>
-              <a:t> by the Flutter team to learn how to pass data to a route directly to its constructor.</a:t>
-            </a:r>
-          </a:p>
-          <a:p>
-            <a:pPr lvl="1"/>
-            <a:endParaRPr lang="en-US" dirty="0"/>
-          </a:p>
-          <a:p>
-            <a:pPr lvl="1"/>
-            <a:r>
-              <a:rPr lang="en-US" dirty="0"/>
-              <a:t>(solution available from the Flutter team in the cookbook)</a:t>
-            </a:r>
-          </a:p>
-          <a:p>
-            <a:pPr lvl="1"/>
-            <a:endParaRPr lang="en-US" dirty="0"/>
-          </a:p>
-        </p:txBody>
-      </p:sp>
       <p:pic>
         <p:nvPicPr>
-          <p:cNvPr id="9" name="Picture 8" descr="Table&#10;&#10;Description automatically generated">
-            <a:extLst>
-              <a:ext uri="{FF2B5EF4-FFF2-40B4-BE49-F238E27FC236}">
-                <a16:creationId xmlns:a16="http://schemas.microsoft.com/office/drawing/2014/main" id="{B931B8C3-031A-CC42-A8B1-D9D3EE491B13}"/>
+          <p:cNvPr id="12" name="Picture 11" descr="A screenshot of a phone&#10;&#10;Description automatically generated">
+            <a:extLst>
+              <a:ext uri="{FF2B5EF4-FFF2-40B4-BE49-F238E27FC236}">
+                <a16:creationId xmlns:a16="http://schemas.microsoft.com/office/drawing/2014/main" id="{FB8EDD8C-3127-468F-854B-62C7445FF640}"/>
               </a:ext>
             </a:extLst>
           </p:cNvPr>
@@ -21978,7 +22377,7 @@
           <p:nvPr/>
         </p:nvPicPr>
         <p:blipFill>
-          <a:blip r:embed="rId3">
+          <a:blip r:embed="rId2">
             <a:extLst>
               <a:ext uri="{28A0092B-C50C-407E-A947-70E740481C1C}">
                 <a14:useLocalDpi xmlns:a14="http://schemas.microsoft.com/office/drawing/2010/main" val="0"/>
@@ -21991,8 +22390,8 @@
         </p:blipFill>
         <p:spPr>
           <a:xfrm>
-            <a:off x="5335270" y="1776460"/>
-            <a:ext cx="2735580" cy="3793539"/>
+            <a:off x="8398051" y="1817146"/>
+            <a:ext cx="3209337" cy="3744227"/>
           </a:xfrm>
           <a:prstGeom prst="rect">
             <a:avLst/>
@@ -22001,10 +22400,10 @@
       </p:pic>
       <p:pic>
         <p:nvPicPr>
-          <p:cNvPr id="11" name="Picture 10" descr="Text&#10;&#10;Description automatically generated with low confidence">
-            <a:extLst>
-              <a:ext uri="{FF2B5EF4-FFF2-40B4-BE49-F238E27FC236}">
-                <a16:creationId xmlns:a16="http://schemas.microsoft.com/office/drawing/2014/main" id="{49A45043-7485-2F4D-85DD-70808F98E2E3}"/>
+          <p:cNvPr id="7" name="Picture 6" descr="A screenshot of a phone&#10;&#10;Description automatically generated">
+            <a:extLst>
+              <a:ext uri="{FF2B5EF4-FFF2-40B4-BE49-F238E27FC236}">
+                <a16:creationId xmlns:a16="http://schemas.microsoft.com/office/drawing/2014/main" id="{0524971C-E8EC-BEA3-6012-05251999C67E}"/>
               </a:ext>
             </a:extLst>
           </p:cNvPr>
@@ -22014,7 +22413,7 @@
           <p:nvPr/>
         </p:nvPicPr>
         <p:blipFill>
-          <a:blip r:embed="rId4">
+          <a:blip r:embed="rId3">
             <a:extLst>
               <a:ext uri="{28A0092B-C50C-407E-A947-70E740481C1C}">
                 <a14:useLocalDpi xmlns:a14="http://schemas.microsoft.com/office/drawing/2010/main" val="0"/>
@@ -22027,14 +22426,112 @@
         </p:blipFill>
         <p:spPr>
           <a:xfrm>
-            <a:off x="8488680" y="1776460"/>
-            <a:ext cx="2735580" cy="3744230"/>
+            <a:off x="4949757" y="1776460"/>
+            <a:ext cx="3191646" cy="3744230"/>
           </a:xfrm>
           <a:prstGeom prst="rect">
             <a:avLst/>
           </a:prstGeom>
         </p:spPr>
       </p:pic>
+      <p:sp>
+        <p:nvSpPr>
+          <p:cNvPr id="2" name="Title 1">
+            <a:extLst>
+              <a:ext uri="{FF2B5EF4-FFF2-40B4-BE49-F238E27FC236}">
+                <a16:creationId xmlns:a16="http://schemas.microsoft.com/office/drawing/2014/main" id="{122C1E14-0610-FB4E-BCD3-3BA8CADF9D02}"/>
+              </a:ext>
+            </a:extLst>
+          </p:cNvPr>
+          <p:cNvSpPr>
+            <a:spLocks noGrp="1"/>
+          </p:cNvSpPr>
+          <p:nvPr>
+            <p:ph type="title"/>
+          </p:nvPr>
+        </p:nvSpPr>
+        <p:spPr/>
+        <p:txBody>
+          <a:bodyPr/>
+          <a:lstStyle/>
+          <a:p>
+            <a:r>
+              <a:rPr lang="en-IT" dirty="0"/>
+              <a:t>Exercise</a:t>
+            </a:r>
+          </a:p>
+        </p:txBody>
+      </p:sp>
+      <p:sp>
+        <p:nvSpPr>
+          <p:cNvPr id="3" name="Content Placeholder 2">
+            <a:extLst>
+              <a:ext uri="{FF2B5EF4-FFF2-40B4-BE49-F238E27FC236}">
+                <a16:creationId xmlns:a16="http://schemas.microsoft.com/office/drawing/2014/main" id="{8962CCAC-9D70-C543-BBE0-822B6CB5F5CB}"/>
+              </a:ext>
+            </a:extLst>
+          </p:cNvPr>
+          <p:cNvSpPr>
+            <a:spLocks noGrp="1"/>
+          </p:cNvSpPr>
+          <p:nvPr>
+            <p:ph idx="1"/>
+          </p:nvPr>
+        </p:nvSpPr>
+        <p:spPr>
+          <a:xfrm>
+            <a:off x="428173" y="1361167"/>
+            <a:ext cx="3835217" cy="5334907"/>
+          </a:xfrm>
+        </p:spPr>
+        <p:txBody>
+          <a:bodyPr>
+            <a:normAutofit/>
+          </a:bodyPr>
+          <a:lstStyle/>
+          <a:p>
+            <a:r>
+              <a:rPr lang="en-GB" dirty="0"/>
+              <a:t>Exercise 06.05 (medium) </a:t>
+            </a:r>
+          </a:p>
+          <a:p>
+            <a:endParaRPr lang="en-GB" dirty="0"/>
+          </a:p>
+          <a:p>
+            <a:pPr lvl="1"/>
+            <a:r>
+              <a:rPr lang="en-US" dirty="0"/>
+              <a:t>Follow the cookbook </a:t>
+            </a:r>
+            <a:r>
+              <a:rPr lang="en-US" dirty="0">
+                <a:hlinkClick r:id="rId4"/>
+              </a:rPr>
+              <a:t>https://docs.flutter.dev/cookbook/navigation/passing-data</a:t>
+            </a:r>
+            <a:r>
+              <a:rPr lang="en-US" dirty="0"/>
+              <a:t> by the Flutter team to learn how to pass data to a route directly to its constructor.</a:t>
+            </a:r>
+          </a:p>
+          <a:p>
+            <a:pPr lvl="1"/>
+            <a:endParaRPr lang="en-US" dirty="0"/>
+          </a:p>
+          <a:p>
+            <a:pPr lvl="1"/>
+            <a:r>
+              <a:rPr lang="en-US" dirty="0"/>
+              <a:t>(solution available from the Flutter team in the cookbook)</a:t>
+            </a:r>
+          </a:p>
+          <a:p>
+            <a:pPr lvl="1"/>
+            <a:endParaRPr lang="en-US" dirty="0"/>
+          </a:p>
+        </p:txBody>
+      </p:sp>
       <p:cxnSp>
         <p:nvCxnSpPr>
           <p:cNvPr id="15" name="Straight Arrow Connector 14">
@@ -22051,8 +22548,8 @@
         </p:nvCxnSpPr>
         <p:spPr>
           <a:xfrm flipV="1">
-            <a:off x="7680960" y="2434590"/>
-            <a:ext cx="1600200" cy="640081"/>
+            <a:off x="7514942" y="2434590"/>
+            <a:ext cx="1766218" cy="994410"/>
           </a:xfrm>
           <a:prstGeom prst="straightConnector1">
             <a:avLst/>

</xml_diff>

<commit_message>
[master] updated lab 10. Fixed a.y. typo.
</commit_message>
<xml_diff>
--- a/lab_06-navigation/lab_06-navigation.pptx
+++ b/lab_06-navigation/lab_06-navigation.pptx
@@ -240,7 +240,7 @@
           <a:p>
             <a:fld id="{81C4B3FE-0320-8142-8396-5C3025C019EC}" type="datetimeFigureOut">
               <a:rPr lang="en-IT" smtClean="0"/>
-              <a:t>4/9/24</a:t>
+              <a:t>5/4/24</a:t>
             </a:fld>
             <a:endParaRPr lang="en-IT"/>
           </a:p>
@@ -2477,7 +2477,7 @@
             </a:pPr>
             <a:r>
               <a:rPr lang="it-IT" sz="2800" dirty="0"/>
-              <a:t>A.Y. 2022-2023</a:t>
+              <a:t>A.Y. 2023-2024</a:t>
             </a:r>
           </a:p>
         </p:txBody>

</xml_diff>